<commit_message>
Ran NBs to check hierarchy change
</commit_message>
<xml_diff>
--- a/misc/group_representation.pptx
+++ b/misc/group_representation.pptx
@@ -6,6 +6,7 @@
   </p:sldMasterIdLst>
   <p:sldIdLst>
     <p:sldId id="256" r:id="rId2"/>
+    <p:sldId id="258" r:id="rId3"/>
   </p:sldIdLst>
   <p:sldSz cx="12192000" cy="6858000"/>
   <p:notesSz cx="6858000" cy="9144000"/>
@@ -104,6 +105,11 @@
       </a:defRPr>
     </a:lvl9pPr>
   </p:defaultTextStyle>
+  <p:extLst>
+    <p:ext uri="{EFAFB233-063F-42B5-8137-9DF3F51BA10A}">
+      <p15:sldGuideLst xmlns:p15="http://schemas.microsoft.com/office/powerpoint/2012/main"/>
+    </p:ext>
+  </p:extLst>
 </p:presentation>
 </file>
 
@@ -254,7 +260,7 @@
           <a:p>
             <a:fld id="{084E4D11-7DD8-6241-BDF9-F23E33E31776}" type="datetimeFigureOut">
               <a:rPr lang="en-US" smtClean="0"/>
-              <a:t>6/25/21</a:t>
+              <a:t>9/10/21</a:t>
             </a:fld>
             <a:endParaRPr lang="en-US"/>
           </a:p>
@@ -452,7 +458,7 @@
           <a:p>
             <a:fld id="{084E4D11-7DD8-6241-BDF9-F23E33E31776}" type="datetimeFigureOut">
               <a:rPr lang="en-US" smtClean="0"/>
-              <a:t>6/25/21</a:t>
+              <a:t>9/10/21</a:t>
             </a:fld>
             <a:endParaRPr lang="en-US"/>
           </a:p>
@@ -660,7 +666,7 @@
           <a:p>
             <a:fld id="{084E4D11-7DD8-6241-BDF9-F23E33E31776}" type="datetimeFigureOut">
               <a:rPr lang="en-US" smtClean="0"/>
-              <a:t>6/25/21</a:t>
+              <a:t>9/10/21</a:t>
             </a:fld>
             <a:endParaRPr lang="en-US"/>
           </a:p>
@@ -858,7 +864,7 @@
           <a:p>
             <a:fld id="{084E4D11-7DD8-6241-BDF9-F23E33E31776}" type="datetimeFigureOut">
               <a:rPr lang="en-US" smtClean="0"/>
-              <a:t>6/25/21</a:t>
+              <a:t>9/10/21</a:t>
             </a:fld>
             <a:endParaRPr lang="en-US"/>
           </a:p>
@@ -1133,7 +1139,7 @@
           <a:p>
             <a:fld id="{084E4D11-7DD8-6241-BDF9-F23E33E31776}" type="datetimeFigureOut">
               <a:rPr lang="en-US" smtClean="0"/>
-              <a:t>6/25/21</a:t>
+              <a:t>9/10/21</a:t>
             </a:fld>
             <a:endParaRPr lang="en-US"/>
           </a:p>
@@ -1398,7 +1404,7 @@
           <a:p>
             <a:fld id="{084E4D11-7DD8-6241-BDF9-F23E33E31776}" type="datetimeFigureOut">
               <a:rPr lang="en-US" smtClean="0"/>
-              <a:t>6/25/21</a:t>
+              <a:t>9/10/21</a:t>
             </a:fld>
             <a:endParaRPr lang="en-US"/>
           </a:p>
@@ -1810,7 +1816,7 @@
           <a:p>
             <a:fld id="{084E4D11-7DD8-6241-BDF9-F23E33E31776}" type="datetimeFigureOut">
               <a:rPr lang="en-US" smtClean="0"/>
-              <a:t>6/25/21</a:t>
+              <a:t>9/10/21</a:t>
             </a:fld>
             <a:endParaRPr lang="en-US"/>
           </a:p>
@@ -1951,7 +1957,7 @@
           <a:p>
             <a:fld id="{084E4D11-7DD8-6241-BDF9-F23E33E31776}" type="datetimeFigureOut">
               <a:rPr lang="en-US" smtClean="0"/>
-              <a:t>6/25/21</a:t>
+              <a:t>9/10/21</a:t>
             </a:fld>
             <a:endParaRPr lang="en-US"/>
           </a:p>
@@ -2064,7 +2070,7 @@
           <a:p>
             <a:fld id="{084E4D11-7DD8-6241-BDF9-F23E33E31776}" type="datetimeFigureOut">
               <a:rPr lang="en-US" smtClean="0"/>
-              <a:t>6/25/21</a:t>
+              <a:t>9/10/21</a:t>
             </a:fld>
             <a:endParaRPr lang="en-US"/>
           </a:p>
@@ -2375,7 +2381,7 @@
           <a:p>
             <a:fld id="{084E4D11-7DD8-6241-BDF9-F23E33E31776}" type="datetimeFigureOut">
               <a:rPr lang="en-US" smtClean="0"/>
-              <a:t>6/25/21</a:t>
+              <a:t>9/10/21</a:t>
             </a:fld>
             <a:endParaRPr lang="en-US"/>
           </a:p>
@@ -2663,7 +2669,7 @@
           <a:p>
             <a:fld id="{084E4D11-7DD8-6241-BDF9-F23E33E31776}" type="datetimeFigureOut">
               <a:rPr lang="en-US" smtClean="0"/>
-              <a:t>6/25/21</a:t>
+              <a:t>9/10/21</a:t>
             </a:fld>
             <a:endParaRPr lang="en-US"/>
           </a:p>
@@ -2904,7 +2910,7 @@
           <a:p>
             <a:fld id="{084E4D11-7DD8-6241-BDF9-F23E33E31776}" type="datetimeFigureOut">
               <a:rPr lang="en-US" smtClean="0"/>
-              <a:t>6/25/21</a:t>
+              <a:t>9/10/21</a:t>
             </a:fld>
             <a:endParaRPr lang="en-US"/>
           </a:p>
@@ -4958,7 +4964,7 @@
             <a:p>
               <a:r>
                 <a:rPr lang="en-US" sz="1600" dirty="0"/>
-                <a:t>Use positions of elements in element list.  Now the element names are, effectively, redundant.</a:t>
+                <a:t>Use positions of elements in element list.  Now the element names are “syntactic sugar”.</a:t>
               </a:r>
             </a:p>
           </p:txBody>
@@ -5003,6 +5009,1332 @@
     <p:extLst>
       <p:ext uri="{BB962C8B-B14F-4D97-AF65-F5344CB8AC3E}">
         <p14:creationId xmlns:p14="http://schemas.microsoft.com/office/powerpoint/2010/main" val="1932726003"/>
+      </p:ext>
+    </p:extLst>
+  </p:cSld>
+  <p:clrMapOvr>
+    <a:masterClrMapping/>
+  </p:clrMapOvr>
+</p:sld>
+</file>
+
+<file path=ppt/slides/slide2.xml><?xml version="1.0" encoding="utf-8"?>
+<p:sld xmlns:a="http://schemas.openxmlformats.org/drawingml/2006/main" xmlns:r="http://schemas.openxmlformats.org/officeDocument/2006/relationships" xmlns:p="http://schemas.openxmlformats.org/presentationml/2006/main">
+  <p:cSld>
+    <p:spTree>
+      <p:nvGrpSpPr>
+        <p:cNvPr id="1" name=""/>
+        <p:cNvGrpSpPr/>
+        <p:nvPr/>
+      </p:nvGrpSpPr>
+      <p:grpSpPr>
+        <a:xfrm>
+          <a:off x="0" y="0"/>
+          <a:ext cx="0" cy="0"/>
+          <a:chOff x="0" y="0"/>
+          <a:chExt cx="0" cy="0"/>
+        </a:xfrm>
+      </p:grpSpPr>
+      <p:sp>
+        <p:nvSpPr>
+          <p:cNvPr id="2" name="Title 1">
+            <a:extLst>
+              <a:ext uri="{FF2B5EF4-FFF2-40B4-BE49-F238E27FC236}">
+                <a16:creationId xmlns:a16="http://schemas.microsoft.com/office/drawing/2014/main" id="{00405B4C-28FF-8644-8CDC-2C90D917D0F6}"/>
+              </a:ext>
+            </a:extLst>
+          </p:cNvPr>
+          <p:cNvSpPr>
+            <a:spLocks noGrp="1"/>
+          </p:cNvSpPr>
+          <p:nvPr>
+            <p:ph type="title"/>
+          </p:nvPr>
+        </p:nvSpPr>
+        <p:spPr>
+          <a:xfrm>
+            <a:off x="605118" y="409950"/>
+            <a:ext cx="3733800" cy="558240"/>
+          </a:xfrm>
+        </p:spPr>
+        <p:txBody>
+          <a:bodyPr>
+            <a:normAutofit fontScale="90000"/>
+          </a:bodyPr>
+          <a:lstStyle/>
+          <a:p>
+            <a:r>
+              <a:rPr lang="en-US" dirty="0"/>
+              <a:t>Class Hierarchy</a:t>
+            </a:r>
+          </a:p>
+        </p:txBody>
+      </p:sp>
+      <p:grpSp>
+        <p:nvGrpSpPr>
+          <p:cNvPr id="61" name="Group 60">
+            <a:extLst>
+              <a:ext uri="{FF2B5EF4-FFF2-40B4-BE49-F238E27FC236}">
+                <a16:creationId xmlns:a16="http://schemas.microsoft.com/office/drawing/2014/main" id="{22A85D30-C1F4-3144-82B3-521AC64085C2}"/>
+              </a:ext>
+            </a:extLst>
+          </p:cNvPr>
+          <p:cNvGrpSpPr/>
+          <p:nvPr/>
+        </p:nvGrpSpPr>
+        <p:grpSpPr>
+          <a:xfrm>
+            <a:off x="4741768" y="1113300"/>
+            <a:ext cx="6315642" cy="4888032"/>
+            <a:chOff x="4266638" y="1104336"/>
+            <a:chExt cx="6315642" cy="4888032"/>
+          </a:xfrm>
+        </p:grpSpPr>
+        <p:sp>
+          <p:nvSpPr>
+            <p:cNvPr id="13" name="TextBox 12">
+              <a:extLst>
+                <a:ext uri="{FF2B5EF4-FFF2-40B4-BE49-F238E27FC236}">
+                  <a16:creationId xmlns:a16="http://schemas.microsoft.com/office/drawing/2014/main" id="{7BB360A3-5B14-6440-93B0-F56070BC6DD9}"/>
+                </a:ext>
+              </a:extLst>
+            </p:cNvPr>
+            <p:cNvSpPr txBox="1"/>
+            <p:nvPr/>
+          </p:nvSpPr>
+          <p:spPr>
+            <a:xfrm>
+              <a:off x="6437777" y="1104336"/>
+              <a:ext cx="1555378" cy="369332"/>
+            </a:xfrm>
+            <a:prstGeom prst="rect">
+              <a:avLst/>
+            </a:prstGeom>
+            <a:noFill/>
+            <a:ln>
+              <a:solidFill>
+                <a:schemeClr val="tx1"/>
+              </a:solidFill>
+              <a:prstDash val="dash"/>
+            </a:ln>
+          </p:spPr>
+          <p:txBody>
+            <a:bodyPr wrap="square" rtlCol="0">
+              <a:spAutoFit/>
+            </a:bodyPr>
+            <a:lstStyle/>
+            <a:p>
+              <a:pPr algn="ctr"/>
+              <a:r>
+                <a:rPr lang="en-US" dirty="0">
+                  <a:solidFill>
+                    <a:schemeClr val="bg2">
+                      <a:lumMod val="50000"/>
+                    </a:schemeClr>
+                  </a:solidFill>
+                </a:rPr>
+                <a:t>FiniteAlgebra</a:t>
+              </a:r>
+            </a:p>
+          </p:txBody>
+        </p:sp>
+        <p:cxnSp>
+          <p:nvCxnSpPr>
+            <p:cNvPr id="24" name="Elbow Connector 23">
+              <a:extLst>
+                <a:ext uri="{FF2B5EF4-FFF2-40B4-BE49-F238E27FC236}">
+                  <a16:creationId xmlns:a16="http://schemas.microsoft.com/office/drawing/2014/main" id="{3583CB7D-A0A9-3E46-A73B-3E6765763ABA}"/>
+                </a:ext>
+              </a:extLst>
+            </p:cNvPr>
+            <p:cNvCxnSpPr>
+              <a:stCxn id="12" idx="0"/>
+              <a:endCxn id="13" idx="1"/>
+            </p:cNvCxnSpPr>
+            <p:nvPr/>
+          </p:nvCxnSpPr>
+          <p:spPr>
+            <a:xfrm rot="5400000" flipH="1" flipV="1">
+              <a:off x="5552424" y="1022954"/>
+              <a:ext cx="619305" cy="1151402"/>
+            </a:xfrm>
+            <a:prstGeom prst="bentConnector2">
+              <a:avLst/>
+            </a:prstGeom>
+            <a:ln w="12700">
+              <a:solidFill>
+                <a:schemeClr val="tx1"/>
+              </a:solidFill>
+              <a:tailEnd type="triangle"/>
+            </a:ln>
+          </p:spPr>
+          <p:style>
+            <a:lnRef idx="1">
+              <a:schemeClr val="accent1"/>
+            </a:lnRef>
+            <a:fillRef idx="0">
+              <a:schemeClr val="accent1"/>
+            </a:fillRef>
+            <a:effectRef idx="0">
+              <a:schemeClr val="accent1"/>
+            </a:effectRef>
+            <a:fontRef idx="minor">
+              <a:schemeClr val="tx1"/>
+            </a:fontRef>
+          </p:style>
+        </p:cxnSp>
+        <p:cxnSp>
+          <p:nvCxnSpPr>
+            <p:cNvPr id="25" name="Elbow Connector 24">
+              <a:extLst>
+                <a:ext uri="{FF2B5EF4-FFF2-40B4-BE49-F238E27FC236}">
+                  <a16:creationId xmlns:a16="http://schemas.microsoft.com/office/drawing/2014/main" id="{729E3818-2A79-AB46-98A7-01920AE85D4D}"/>
+                </a:ext>
+              </a:extLst>
+            </p:cNvPr>
+            <p:cNvCxnSpPr>
+              <a:cxnSpLocks/>
+              <a:stCxn id="11" idx="0"/>
+              <a:endCxn id="13" idx="3"/>
+            </p:cNvCxnSpPr>
+            <p:nvPr/>
+          </p:nvCxnSpPr>
+          <p:spPr>
+            <a:xfrm rot="16200000" flipV="1">
+              <a:off x="8010436" y="1271722"/>
+              <a:ext cx="619305" cy="653866"/>
+            </a:xfrm>
+            <a:prstGeom prst="bentConnector2">
+              <a:avLst/>
+            </a:prstGeom>
+            <a:ln w="12700">
+              <a:solidFill>
+                <a:schemeClr val="tx1"/>
+              </a:solidFill>
+              <a:tailEnd type="triangle"/>
+            </a:ln>
+          </p:spPr>
+          <p:style>
+            <a:lnRef idx="1">
+              <a:schemeClr val="accent1"/>
+            </a:lnRef>
+            <a:fillRef idx="0">
+              <a:schemeClr val="accent1"/>
+            </a:fillRef>
+            <a:effectRef idx="0">
+              <a:schemeClr val="accent1"/>
+            </a:effectRef>
+            <a:fontRef idx="minor">
+              <a:schemeClr val="tx1"/>
+            </a:fontRef>
+          </p:style>
+        </p:cxnSp>
+        <p:grpSp>
+          <p:nvGrpSpPr>
+            <p:cNvPr id="60" name="Group 59">
+              <a:extLst>
+                <a:ext uri="{FF2B5EF4-FFF2-40B4-BE49-F238E27FC236}">
+                  <a16:creationId xmlns:a16="http://schemas.microsoft.com/office/drawing/2014/main" id="{3DCBDCC1-0F2B-2442-A5A5-51B5D373ED78}"/>
+                </a:ext>
+              </a:extLst>
+            </p:cNvPr>
+            <p:cNvGrpSpPr/>
+            <p:nvPr/>
+          </p:nvGrpSpPr>
+          <p:grpSpPr>
+            <a:xfrm>
+              <a:off x="7804337" y="1631139"/>
+              <a:ext cx="2777943" cy="4361229"/>
+              <a:chOff x="7804337" y="1631139"/>
+              <a:chExt cx="2777943" cy="4361229"/>
+            </a:xfrm>
+          </p:grpSpPr>
+          <p:sp>
+            <p:nvSpPr>
+              <p:cNvPr id="5" name="TextBox 4">
+                <a:extLst>
+                  <a:ext uri="{FF2B5EF4-FFF2-40B4-BE49-F238E27FC236}">
+                    <a16:creationId xmlns:a16="http://schemas.microsoft.com/office/drawing/2014/main" id="{7611AD06-6C37-7F4A-977A-0DDCA27B154A}"/>
+                  </a:ext>
+                </a:extLst>
+              </p:cNvPr>
+              <p:cNvSpPr txBox="1"/>
+              <p:nvPr/>
+            </p:nvSpPr>
+            <p:spPr>
+              <a:xfrm>
+                <a:off x="8171890" y="2527176"/>
+                <a:ext cx="950260" cy="369332"/>
+              </a:xfrm>
+              <a:prstGeom prst="rect">
+                <a:avLst/>
+              </a:prstGeom>
+              <a:noFill/>
+              <a:ln>
+                <a:solidFill>
+                  <a:schemeClr val="tx1"/>
+                </a:solidFill>
+              </a:ln>
+            </p:spPr>
+            <p:txBody>
+              <a:bodyPr wrap="square" rtlCol="0">
+                <a:spAutoFit/>
+              </a:bodyPr>
+              <a:lstStyle/>
+              <a:p>
+                <a:pPr algn="ctr"/>
+                <a:r>
+                  <a:rPr lang="en-US" dirty="0"/>
+                  <a:t>Magma</a:t>
+                </a:r>
+              </a:p>
+            </p:txBody>
+          </p:sp>
+          <p:sp>
+            <p:nvSpPr>
+              <p:cNvPr id="6" name="TextBox 5">
+                <a:extLst>
+                  <a:ext uri="{FF2B5EF4-FFF2-40B4-BE49-F238E27FC236}">
+                    <a16:creationId xmlns:a16="http://schemas.microsoft.com/office/drawing/2014/main" id="{425F538C-D18F-B748-8430-6DB1D566CED8}"/>
+                  </a:ext>
+                </a:extLst>
+              </p:cNvPr>
+              <p:cNvSpPr txBox="1"/>
+              <p:nvPr/>
+            </p:nvSpPr>
+            <p:spPr>
+              <a:xfrm>
+                <a:off x="8019490" y="3146045"/>
+                <a:ext cx="1255060" cy="369332"/>
+              </a:xfrm>
+              <a:prstGeom prst="rect">
+                <a:avLst/>
+              </a:prstGeom>
+              <a:noFill/>
+              <a:ln>
+                <a:solidFill>
+                  <a:schemeClr val="tx1"/>
+                </a:solidFill>
+              </a:ln>
+            </p:spPr>
+            <p:txBody>
+              <a:bodyPr wrap="square" rtlCol="0">
+                <a:spAutoFit/>
+              </a:bodyPr>
+              <a:lstStyle/>
+              <a:p>
+                <a:pPr algn="ctr"/>
+                <a:r>
+                  <a:rPr lang="en-US" dirty="0"/>
+                  <a:t>Semigroup</a:t>
+                </a:r>
+              </a:p>
+            </p:txBody>
+          </p:sp>
+          <p:sp>
+            <p:nvSpPr>
+              <p:cNvPr id="7" name="TextBox 6">
+                <a:extLst>
+                  <a:ext uri="{FF2B5EF4-FFF2-40B4-BE49-F238E27FC236}">
+                    <a16:creationId xmlns:a16="http://schemas.microsoft.com/office/drawing/2014/main" id="{5ADF05FE-A045-6745-8C04-859A35075CF2}"/>
+                  </a:ext>
+                </a:extLst>
+              </p:cNvPr>
+              <p:cNvSpPr txBox="1"/>
+              <p:nvPr/>
+            </p:nvSpPr>
+            <p:spPr>
+              <a:xfrm>
+                <a:off x="8171890" y="3764914"/>
+                <a:ext cx="950260" cy="369332"/>
+              </a:xfrm>
+              <a:prstGeom prst="rect">
+                <a:avLst/>
+              </a:prstGeom>
+              <a:noFill/>
+              <a:ln>
+                <a:solidFill>
+                  <a:schemeClr val="tx1"/>
+                </a:solidFill>
+              </a:ln>
+            </p:spPr>
+            <p:txBody>
+              <a:bodyPr wrap="square" rtlCol="0">
+                <a:spAutoFit/>
+              </a:bodyPr>
+              <a:lstStyle/>
+              <a:p>
+                <a:pPr algn="ctr"/>
+                <a:r>
+                  <a:rPr lang="en-US" dirty="0"/>
+                  <a:t>Monoid</a:t>
+                </a:r>
+              </a:p>
+            </p:txBody>
+          </p:sp>
+          <p:sp>
+            <p:nvSpPr>
+              <p:cNvPr id="8" name="TextBox 7">
+                <a:extLst>
+                  <a:ext uri="{FF2B5EF4-FFF2-40B4-BE49-F238E27FC236}">
+                    <a16:creationId xmlns:a16="http://schemas.microsoft.com/office/drawing/2014/main" id="{A6C970E0-AD34-7143-957E-260670E9C130}"/>
+                  </a:ext>
+                </a:extLst>
+              </p:cNvPr>
+              <p:cNvSpPr txBox="1"/>
+              <p:nvPr/>
+            </p:nvSpPr>
+            <p:spPr>
+              <a:xfrm>
+                <a:off x="8171891" y="4385299"/>
+                <a:ext cx="950260" cy="369332"/>
+              </a:xfrm>
+              <a:prstGeom prst="rect">
+                <a:avLst/>
+              </a:prstGeom>
+              <a:noFill/>
+              <a:ln>
+                <a:solidFill>
+                  <a:schemeClr val="tx1"/>
+                </a:solidFill>
+              </a:ln>
+            </p:spPr>
+            <p:txBody>
+              <a:bodyPr wrap="square" rtlCol="0">
+                <a:spAutoFit/>
+              </a:bodyPr>
+              <a:lstStyle/>
+              <a:p>
+                <a:pPr algn="ctr"/>
+                <a:r>
+                  <a:rPr lang="en-US" dirty="0"/>
+                  <a:t>Group</a:t>
+                </a:r>
+              </a:p>
+            </p:txBody>
+          </p:sp>
+          <p:sp>
+            <p:nvSpPr>
+              <p:cNvPr id="9" name="TextBox 8">
+                <a:extLst>
+                  <a:ext uri="{FF2B5EF4-FFF2-40B4-BE49-F238E27FC236}">
+                    <a16:creationId xmlns:a16="http://schemas.microsoft.com/office/drawing/2014/main" id="{9A361C39-41AF-5349-A1FD-A0CF4DC9E80C}"/>
+                  </a:ext>
+                </a:extLst>
+              </p:cNvPr>
+              <p:cNvSpPr txBox="1"/>
+              <p:nvPr/>
+            </p:nvSpPr>
+            <p:spPr>
+              <a:xfrm>
+                <a:off x="8270503" y="5004168"/>
+                <a:ext cx="753037" cy="369332"/>
+              </a:xfrm>
+              <a:prstGeom prst="rect">
+                <a:avLst/>
+              </a:prstGeom>
+              <a:noFill/>
+              <a:ln>
+                <a:solidFill>
+                  <a:schemeClr val="tx1"/>
+                </a:solidFill>
+              </a:ln>
+            </p:spPr>
+            <p:txBody>
+              <a:bodyPr wrap="square" rtlCol="0">
+                <a:spAutoFit/>
+              </a:bodyPr>
+              <a:lstStyle/>
+              <a:p>
+                <a:pPr algn="ctr"/>
+                <a:r>
+                  <a:rPr lang="en-US" dirty="0"/>
+                  <a:t>Ring</a:t>
+                </a:r>
+              </a:p>
+            </p:txBody>
+          </p:sp>
+          <p:sp>
+            <p:nvSpPr>
+              <p:cNvPr id="10" name="TextBox 9">
+                <a:extLst>
+                  <a:ext uri="{FF2B5EF4-FFF2-40B4-BE49-F238E27FC236}">
+                    <a16:creationId xmlns:a16="http://schemas.microsoft.com/office/drawing/2014/main" id="{B19115DF-D4EF-C74C-80A0-6F8E6B23EBBF}"/>
+                  </a:ext>
+                </a:extLst>
+              </p:cNvPr>
+              <p:cNvSpPr txBox="1"/>
+              <p:nvPr/>
+            </p:nvSpPr>
+            <p:spPr>
+              <a:xfrm>
+                <a:off x="8270503" y="5623036"/>
+                <a:ext cx="753037" cy="369332"/>
+              </a:xfrm>
+              <a:prstGeom prst="rect">
+                <a:avLst/>
+              </a:prstGeom>
+              <a:noFill/>
+              <a:ln>
+                <a:solidFill>
+                  <a:schemeClr val="tx1"/>
+                </a:solidFill>
+              </a:ln>
+            </p:spPr>
+            <p:txBody>
+              <a:bodyPr wrap="square" rtlCol="0">
+                <a:spAutoFit/>
+              </a:bodyPr>
+              <a:lstStyle/>
+              <a:p>
+                <a:pPr algn="ctr"/>
+                <a:r>
+                  <a:rPr lang="en-US" dirty="0"/>
+                  <a:t>Field</a:t>
+                </a:r>
+              </a:p>
+            </p:txBody>
+          </p:sp>
+          <p:sp>
+            <p:nvSpPr>
+              <p:cNvPr id="11" name="TextBox 10">
+                <a:extLst>
+                  <a:ext uri="{FF2B5EF4-FFF2-40B4-BE49-F238E27FC236}">
+                    <a16:creationId xmlns:a16="http://schemas.microsoft.com/office/drawing/2014/main" id="{7D16A718-6130-AD41-A15A-7C75C84ED431}"/>
+                  </a:ext>
+                </a:extLst>
+              </p:cNvPr>
+              <p:cNvSpPr txBox="1"/>
+              <p:nvPr/>
+            </p:nvSpPr>
+            <p:spPr>
+              <a:xfrm>
+                <a:off x="7804337" y="1908307"/>
+                <a:ext cx="1685367" cy="369332"/>
+              </a:xfrm>
+              <a:prstGeom prst="rect">
+                <a:avLst/>
+              </a:prstGeom>
+              <a:noFill/>
+              <a:ln>
+                <a:solidFill>
+                  <a:schemeClr val="tx1"/>
+                </a:solidFill>
+                <a:prstDash val="dash"/>
+              </a:ln>
+            </p:spPr>
+            <p:txBody>
+              <a:bodyPr wrap="square" rtlCol="0">
+                <a:spAutoFit/>
+              </a:bodyPr>
+              <a:lstStyle/>
+              <a:p>
+                <a:pPr algn="ctr"/>
+                <a:r>
+                  <a:rPr lang="en-US" dirty="0">
+                    <a:solidFill>
+                      <a:schemeClr val="bg2">
+                        <a:lumMod val="50000"/>
+                      </a:schemeClr>
+                    </a:solidFill>
+                  </a:rPr>
+                  <a:t>SimpleAlgebra</a:t>
+                </a:r>
+              </a:p>
+            </p:txBody>
+          </p:sp>
+          <p:cxnSp>
+            <p:nvCxnSpPr>
+              <p:cNvPr id="17" name="Straight Arrow Connector 16">
+                <a:extLst>
+                  <a:ext uri="{FF2B5EF4-FFF2-40B4-BE49-F238E27FC236}">
+                    <a16:creationId xmlns:a16="http://schemas.microsoft.com/office/drawing/2014/main" id="{531E1E9C-6DA2-454B-B8BE-4F668ACB682E}"/>
+                  </a:ext>
+                </a:extLst>
+              </p:cNvPr>
+              <p:cNvCxnSpPr/>
+              <p:nvPr/>
+            </p:nvCxnSpPr>
+            <p:spPr>
+              <a:xfrm flipV="1">
+                <a:off x="8640296" y="2895772"/>
+                <a:ext cx="0" cy="250273"/>
+              </a:xfrm>
+              <a:prstGeom prst="straightConnector1">
+                <a:avLst/>
+              </a:prstGeom>
+              <a:ln w="12700">
+                <a:solidFill>
+                  <a:schemeClr val="tx1"/>
+                </a:solidFill>
+                <a:tailEnd type="triangle"/>
+              </a:ln>
+            </p:spPr>
+            <p:style>
+              <a:lnRef idx="1">
+                <a:schemeClr val="accent1"/>
+              </a:lnRef>
+              <a:fillRef idx="0">
+                <a:schemeClr val="accent1"/>
+              </a:fillRef>
+              <a:effectRef idx="0">
+                <a:schemeClr val="accent1"/>
+              </a:effectRef>
+              <a:fontRef idx="minor">
+                <a:schemeClr val="tx1"/>
+              </a:fontRef>
+            </p:style>
+          </p:cxnSp>
+          <p:cxnSp>
+            <p:nvCxnSpPr>
+              <p:cNvPr id="18" name="Straight Arrow Connector 17">
+                <a:extLst>
+                  <a:ext uri="{FF2B5EF4-FFF2-40B4-BE49-F238E27FC236}">
+                    <a16:creationId xmlns:a16="http://schemas.microsoft.com/office/drawing/2014/main" id="{9C3E105D-9706-1540-8683-BF62B1F3164D}"/>
+                  </a:ext>
+                </a:extLst>
+              </p:cNvPr>
+              <p:cNvCxnSpPr/>
+              <p:nvPr/>
+            </p:nvCxnSpPr>
+            <p:spPr>
+              <a:xfrm flipV="1">
+                <a:off x="8640296" y="2276903"/>
+                <a:ext cx="0" cy="250273"/>
+              </a:xfrm>
+              <a:prstGeom prst="straightConnector1">
+                <a:avLst/>
+              </a:prstGeom>
+              <a:ln w="12700">
+                <a:solidFill>
+                  <a:schemeClr val="tx1"/>
+                </a:solidFill>
+                <a:tailEnd type="triangle"/>
+              </a:ln>
+            </p:spPr>
+            <p:style>
+              <a:lnRef idx="1">
+                <a:schemeClr val="accent1"/>
+              </a:lnRef>
+              <a:fillRef idx="0">
+                <a:schemeClr val="accent1"/>
+              </a:fillRef>
+              <a:effectRef idx="0">
+                <a:schemeClr val="accent1"/>
+              </a:effectRef>
+              <a:fontRef idx="minor">
+                <a:schemeClr val="tx1"/>
+              </a:fontRef>
+            </p:style>
+          </p:cxnSp>
+          <p:cxnSp>
+            <p:nvCxnSpPr>
+              <p:cNvPr id="19" name="Straight Arrow Connector 18">
+                <a:extLst>
+                  <a:ext uri="{FF2B5EF4-FFF2-40B4-BE49-F238E27FC236}">
+                    <a16:creationId xmlns:a16="http://schemas.microsoft.com/office/drawing/2014/main" id="{0BC6307A-9345-6340-A679-C30B2B11F6DA}"/>
+                  </a:ext>
+                </a:extLst>
+              </p:cNvPr>
+              <p:cNvCxnSpPr/>
+              <p:nvPr/>
+            </p:nvCxnSpPr>
+            <p:spPr>
+              <a:xfrm flipV="1">
+                <a:off x="8640296" y="3514641"/>
+                <a:ext cx="0" cy="250273"/>
+              </a:xfrm>
+              <a:prstGeom prst="straightConnector1">
+                <a:avLst/>
+              </a:prstGeom>
+              <a:ln w="12700">
+                <a:solidFill>
+                  <a:schemeClr val="tx1"/>
+                </a:solidFill>
+                <a:tailEnd type="triangle"/>
+              </a:ln>
+            </p:spPr>
+            <p:style>
+              <a:lnRef idx="1">
+                <a:schemeClr val="accent1"/>
+              </a:lnRef>
+              <a:fillRef idx="0">
+                <a:schemeClr val="accent1"/>
+              </a:fillRef>
+              <a:effectRef idx="0">
+                <a:schemeClr val="accent1"/>
+              </a:effectRef>
+              <a:fontRef idx="minor">
+                <a:schemeClr val="tx1"/>
+              </a:fontRef>
+            </p:style>
+          </p:cxnSp>
+          <p:cxnSp>
+            <p:nvCxnSpPr>
+              <p:cNvPr id="20" name="Straight Arrow Connector 19">
+                <a:extLst>
+                  <a:ext uri="{FF2B5EF4-FFF2-40B4-BE49-F238E27FC236}">
+                    <a16:creationId xmlns:a16="http://schemas.microsoft.com/office/drawing/2014/main" id="{1F07E47C-BE41-EC4E-A857-45958E82C647}"/>
+                  </a:ext>
+                </a:extLst>
+              </p:cNvPr>
+              <p:cNvCxnSpPr/>
+              <p:nvPr/>
+            </p:nvCxnSpPr>
+            <p:spPr>
+              <a:xfrm flipV="1">
+                <a:off x="8640296" y="4134246"/>
+                <a:ext cx="0" cy="250273"/>
+              </a:xfrm>
+              <a:prstGeom prst="straightConnector1">
+                <a:avLst/>
+              </a:prstGeom>
+              <a:ln w="12700">
+                <a:solidFill>
+                  <a:schemeClr val="tx1"/>
+                </a:solidFill>
+                <a:tailEnd type="triangle"/>
+              </a:ln>
+            </p:spPr>
+            <p:style>
+              <a:lnRef idx="1">
+                <a:schemeClr val="accent1"/>
+              </a:lnRef>
+              <a:fillRef idx="0">
+                <a:schemeClr val="accent1"/>
+              </a:fillRef>
+              <a:effectRef idx="0">
+                <a:schemeClr val="accent1"/>
+              </a:effectRef>
+              <a:fontRef idx="minor">
+                <a:schemeClr val="tx1"/>
+              </a:fontRef>
+            </p:style>
+          </p:cxnSp>
+          <p:cxnSp>
+            <p:nvCxnSpPr>
+              <p:cNvPr id="21" name="Straight Arrow Connector 20">
+                <a:extLst>
+                  <a:ext uri="{FF2B5EF4-FFF2-40B4-BE49-F238E27FC236}">
+                    <a16:creationId xmlns:a16="http://schemas.microsoft.com/office/drawing/2014/main" id="{075623BA-FD7E-FA49-A8C8-84FFAB19A5BC}"/>
+                  </a:ext>
+                </a:extLst>
+              </p:cNvPr>
+              <p:cNvCxnSpPr/>
+              <p:nvPr/>
+            </p:nvCxnSpPr>
+            <p:spPr>
+              <a:xfrm flipV="1">
+                <a:off x="8640297" y="4753895"/>
+                <a:ext cx="0" cy="250273"/>
+              </a:xfrm>
+              <a:prstGeom prst="straightConnector1">
+                <a:avLst/>
+              </a:prstGeom>
+              <a:ln w="12700">
+                <a:solidFill>
+                  <a:schemeClr val="tx1"/>
+                </a:solidFill>
+                <a:tailEnd type="triangle"/>
+              </a:ln>
+            </p:spPr>
+            <p:style>
+              <a:lnRef idx="1">
+                <a:schemeClr val="accent1"/>
+              </a:lnRef>
+              <a:fillRef idx="0">
+                <a:schemeClr val="accent1"/>
+              </a:fillRef>
+              <a:effectRef idx="0">
+                <a:schemeClr val="accent1"/>
+              </a:effectRef>
+              <a:fontRef idx="minor">
+                <a:schemeClr val="tx1"/>
+              </a:fontRef>
+            </p:style>
+          </p:cxnSp>
+          <p:cxnSp>
+            <p:nvCxnSpPr>
+              <p:cNvPr id="22" name="Straight Arrow Connector 21">
+                <a:extLst>
+                  <a:ext uri="{FF2B5EF4-FFF2-40B4-BE49-F238E27FC236}">
+                    <a16:creationId xmlns:a16="http://schemas.microsoft.com/office/drawing/2014/main" id="{0C26E0E3-0909-AE4C-8827-4159EABF2992}"/>
+                  </a:ext>
+                </a:extLst>
+              </p:cNvPr>
+              <p:cNvCxnSpPr/>
+              <p:nvPr/>
+            </p:nvCxnSpPr>
+            <p:spPr>
+              <a:xfrm flipV="1">
+                <a:off x="8640297" y="5373500"/>
+                <a:ext cx="0" cy="250273"/>
+              </a:xfrm>
+              <a:prstGeom prst="straightConnector1">
+                <a:avLst/>
+              </a:prstGeom>
+              <a:ln w="12700">
+                <a:solidFill>
+                  <a:schemeClr val="tx1"/>
+                </a:solidFill>
+                <a:tailEnd type="triangle"/>
+              </a:ln>
+            </p:spPr>
+            <p:style>
+              <a:lnRef idx="1">
+                <a:schemeClr val="accent1"/>
+              </a:lnRef>
+              <a:fillRef idx="0">
+                <a:schemeClr val="accent1"/>
+              </a:fillRef>
+              <a:effectRef idx="0">
+                <a:schemeClr val="accent1"/>
+              </a:effectRef>
+              <a:fontRef idx="minor">
+                <a:schemeClr val="tx1"/>
+              </a:fontRef>
+            </p:style>
+          </p:cxnSp>
+          <p:sp>
+            <p:nvSpPr>
+              <p:cNvPr id="40" name="TextBox 39">
+                <a:extLst>
+                  <a:ext uri="{FF2B5EF4-FFF2-40B4-BE49-F238E27FC236}">
+                    <a16:creationId xmlns:a16="http://schemas.microsoft.com/office/drawing/2014/main" id="{C1EED93F-72C8-B843-83CE-BD80C2497B37}"/>
+                  </a:ext>
+                </a:extLst>
+              </p:cNvPr>
+              <p:cNvSpPr txBox="1"/>
+              <p:nvPr/>
+            </p:nvSpPr>
+            <p:spPr>
+              <a:xfrm>
+                <a:off x="8647037" y="1631139"/>
+                <a:ext cx="1935243" cy="276999"/>
+              </a:xfrm>
+              <a:prstGeom prst="rect">
+                <a:avLst/>
+              </a:prstGeom>
+              <a:noFill/>
+            </p:spPr>
+            <p:txBody>
+              <a:bodyPr wrap="square" rtlCol="0">
+                <a:spAutoFit/>
+              </a:bodyPr>
+              <a:lstStyle/>
+              <a:p>
+                <a:r>
+                  <a:rPr lang="en-US" sz="1200" dirty="0"/>
+                  <a:t>Has a single set of elements</a:t>
+                </a:r>
+              </a:p>
+            </p:txBody>
+          </p:sp>
+        </p:grpSp>
+        <p:grpSp>
+          <p:nvGrpSpPr>
+            <p:cNvPr id="59" name="Group 58">
+              <a:extLst>
+                <a:ext uri="{FF2B5EF4-FFF2-40B4-BE49-F238E27FC236}">
+                  <a16:creationId xmlns:a16="http://schemas.microsoft.com/office/drawing/2014/main" id="{70B03B93-E81C-9049-8AFE-A2598E75C4B6}"/>
+                </a:ext>
+              </a:extLst>
+            </p:cNvPr>
+            <p:cNvGrpSpPr/>
+            <p:nvPr/>
+          </p:nvGrpSpPr>
+          <p:grpSpPr>
+            <a:xfrm>
+              <a:off x="4266638" y="1631139"/>
+              <a:ext cx="3190877" cy="1884238"/>
+              <a:chOff x="4266638" y="1631139"/>
+              <a:chExt cx="3190877" cy="1884238"/>
+            </a:xfrm>
+          </p:grpSpPr>
+          <p:sp>
+            <p:nvSpPr>
+              <p:cNvPr id="3" name="TextBox 2">
+                <a:extLst>
+                  <a:ext uri="{FF2B5EF4-FFF2-40B4-BE49-F238E27FC236}">
+                    <a16:creationId xmlns:a16="http://schemas.microsoft.com/office/drawing/2014/main" id="{F1AD1DAA-B8CC-4741-B579-50D339A84149}"/>
+                  </a:ext>
+                </a:extLst>
+              </p:cNvPr>
+              <p:cNvSpPr txBox="1"/>
+              <p:nvPr/>
+            </p:nvSpPr>
+            <p:spPr>
+              <a:xfrm>
+                <a:off x="4542303" y="3146045"/>
+                <a:ext cx="1488142" cy="369332"/>
+              </a:xfrm>
+              <a:prstGeom prst="rect">
+                <a:avLst/>
+              </a:prstGeom>
+              <a:noFill/>
+              <a:ln>
+                <a:solidFill>
+                  <a:schemeClr val="tx1"/>
+                </a:solidFill>
+              </a:ln>
+            </p:spPr>
+            <p:txBody>
+              <a:bodyPr wrap="square" rtlCol="0">
+                <a:spAutoFit/>
+              </a:bodyPr>
+              <a:lstStyle/>
+              <a:p>
+                <a:pPr algn="ctr"/>
+                <a:r>
+                  <a:rPr lang="en-US" dirty="0"/>
+                  <a:t>VectorSpace</a:t>
+                </a:r>
+              </a:p>
+            </p:txBody>
+          </p:sp>
+          <p:sp>
+            <p:nvSpPr>
+              <p:cNvPr id="4" name="TextBox 3">
+                <a:extLst>
+                  <a:ext uri="{FF2B5EF4-FFF2-40B4-BE49-F238E27FC236}">
+                    <a16:creationId xmlns:a16="http://schemas.microsoft.com/office/drawing/2014/main" id="{AF2ED9AD-ACB8-2343-B41E-FCA9A39C59CD}"/>
+                  </a:ext>
+                </a:extLst>
+              </p:cNvPr>
+              <p:cNvSpPr txBox="1"/>
+              <p:nvPr/>
+            </p:nvSpPr>
+            <p:spPr>
+              <a:xfrm>
+                <a:off x="4793315" y="2527912"/>
+                <a:ext cx="986119" cy="369332"/>
+              </a:xfrm>
+              <a:prstGeom prst="rect">
+                <a:avLst/>
+              </a:prstGeom>
+              <a:noFill/>
+              <a:ln>
+                <a:solidFill>
+                  <a:schemeClr val="tx1"/>
+                </a:solidFill>
+              </a:ln>
+            </p:spPr>
+            <p:txBody>
+              <a:bodyPr wrap="square" rtlCol="0">
+                <a:spAutoFit/>
+              </a:bodyPr>
+              <a:lstStyle/>
+              <a:p>
+                <a:pPr algn="ctr"/>
+                <a:r>
+                  <a:rPr lang="en-US" dirty="0"/>
+                  <a:t>Module</a:t>
+                </a:r>
+              </a:p>
+            </p:txBody>
+          </p:sp>
+          <p:sp>
+            <p:nvSpPr>
+              <p:cNvPr id="12" name="TextBox 11">
+                <a:extLst>
+                  <a:ext uri="{FF2B5EF4-FFF2-40B4-BE49-F238E27FC236}">
+                    <a16:creationId xmlns:a16="http://schemas.microsoft.com/office/drawing/2014/main" id="{A6729132-0692-EC44-8603-F45E2513B144}"/>
+                  </a:ext>
+                </a:extLst>
+              </p:cNvPr>
+              <p:cNvSpPr txBox="1"/>
+              <p:nvPr/>
+            </p:nvSpPr>
+            <p:spPr>
+              <a:xfrm>
+                <a:off x="4266638" y="1908307"/>
+                <a:ext cx="2039473" cy="369332"/>
+              </a:xfrm>
+              <a:prstGeom prst="rect">
+                <a:avLst/>
+              </a:prstGeom>
+              <a:noFill/>
+              <a:ln>
+                <a:solidFill>
+                  <a:schemeClr val="tx1"/>
+                </a:solidFill>
+                <a:prstDash val="dash"/>
+              </a:ln>
+            </p:spPr>
+            <p:txBody>
+              <a:bodyPr wrap="square" rtlCol="0">
+                <a:spAutoFit/>
+              </a:bodyPr>
+              <a:lstStyle/>
+              <a:p>
+                <a:pPr algn="ctr"/>
+                <a:r>
+                  <a:rPr lang="en-US" dirty="0">
+                    <a:solidFill>
+                      <a:schemeClr val="bg2">
+                        <a:lumMod val="50000"/>
+                      </a:schemeClr>
+                    </a:solidFill>
+                  </a:rPr>
+                  <a:t>CompositeAlgebra</a:t>
+                </a:r>
+              </a:p>
+            </p:txBody>
+          </p:sp>
+          <p:cxnSp>
+            <p:nvCxnSpPr>
+              <p:cNvPr id="15" name="Straight Arrow Connector 14">
+                <a:extLst>
+                  <a:ext uri="{FF2B5EF4-FFF2-40B4-BE49-F238E27FC236}">
+                    <a16:creationId xmlns:a16="http://schemas.microsoft.com/office/drawing/2014/main" id="{DB8A980A-C926-5241-ABC6-5306A7D5948F}"/>
+                  </a:ext>
+                </a:extLst>
+              </p:cNvPr>
+              <p:cNvCxnSpPr>
+                <a:stCxn id="4" idx="0"/>
+                <a:endCxn id="12" idx="2"/>
+              </p:cNvCxnSpPr>
+              <p:nvPr/>
+            </p:nvCxnSpPr>
+            <p:spPr>
+              <a:xfrm flipV="1">
+                <a:off x="5286375" y="2277639"/>
+                <a:ext cx="0" cy="250273"/>
+              </a:xfrm>
+              <a:prstGeom prst="straightConnector1">
+                <a:avLst/>
+              </a:prstGeom>
+              <a:ln w="12700">
+                <a:solidFill>
+                  <a:schemeClr val="tx1"/>
+                </a:solidFill>
+                <a:tailEnd type="triangle"/>
+              </a:ln>
+            </p:spPr>
+            <p:style>
+              <a:lnRef idx="1">
+                <a:schemeClr val="accent1"/>
+              </a:lnRef>
+              <a:fillRef idx="0">
+                <a:schemeClr val="accent1"/>
+              </a:fillRef>
+              <a:effectRef idx="0">
+                <a:schemeClr val="accent1"/>
+              </a:effectRef>
+              <a:fontRef idx="minor">
+                <a:schemeClr val="tx1"/>
+              </a:fontRef>
+            </p:style>
+          </p:cxnSp>
+          <p:cxnSp>
+            <p:nvCxnSpPr>
+              <p:cNvPr id="16" name="Straight Arrow Connector 15">
+                <a:extLst>
+                  <a:ext uri="{FF2B5EF4-FFF2-40B4-BE49-F238E27FC236}">
+                    <a16:creationId xmlns:a16="http://schemas.microsoft.com/office/drawing/2014/main" id="{EBC6DA3B-9B3F-3A4A-9910-25CE75BCDD9B}"/>
+                  </a:ext>
+                </a:extLst>
+              </p:cNvPr>
+              <p:cNvCxnSpPr/>
+              <p:nvPr/>
+            </p:nvCxnSpPr>
+            <p:spPr>
+              <a:xfrm flipV="1">
+                <a:off x="5286375" y="2895772"/>
+                <a:ext cx="0" cy="250273"/>
+              </a:xfrm>
+              <a:prstGeom prst="straightConnector1">
+                <a:avLst/>
+              </a:prstGeom>
+              <a:ln w="12700">
+                <a:solidFill>
+                  <a:schemeClr val="tx1"/>
+                </a:solidFill>
+                <a:tailEnd type="triangle"/>
+              </a:ln>
+            </p:spPr>
+            <p:style>
+              <a:lnRef idx="1">
+                <a:schemeClr val="accent1"/>
+              </a:lnRef>
+              <a:fillRef idx="0">
+                <a:schemeClr val="accent1"/>
+              </a:fillRef>
+              <a:effectRef idx="0">
+                <a:schemeClr val="accent1"/>
+              </a:effectRef>
+              <a:fontRef idx="minor">
+                <a:schemeClr val="tx1"/>
+              </a:fontRef>
+            </p:style>
+          </p:cxnSp>
+          <p:sp>
+            <p:nvSpPr>
+              <p:cNvPr id="43" name="TextBox 42">
+                <a:extLst>
+                  <a:ext uri="{FF2B5EF4-FFF2-40B4-BE49-F238E27FC236}">
+                    <a16:creationId xmlns:a16="http://schemas.microsoft.com/office/drawing/2014/main" id="{C0F0D1B3-E284-5842-BC6B-3AFC9DE2462C}"/>
+                  </a:ext>
+                </a:extLst>
+              </p:cNvPr>
+              <p:cNvSpPr txBox="1"/>
+              <p:nvPr/>
+            </p:nvSpPr>
+            <p:spPr>
+              <a:xfrm>
+                <a:off x="5286374" y="1631139"/>
+                <a:ext cx="2171141" cy="276999"/>
+              </a:xfrm>
+              <a:prstGeom prst="rect">
+                <a:avLst/>
+              </a:prstGeom>
+              <a:noFill/>
+            </p:spPr>
+            <p:txBody>
+              <a:bodyPr wrap="square" rtlCol="0">
+                <a:spAutoFit/>
+              </a:bodyPr>
+              <a:lstStyle/>
+              <a:p>
+                <a:r>
+                  <a:rPr lang="en-US" sz="1200" dirty="0"/>
+                  <a:t>Has a multiple sets of elements</a:t>
+                </a:r>
+              </a:p>
+            </p:txBody>
+          </p:sp>
+        </p:grpSp>
+        <p:grpSp>
+          <p:nvGrpSpPr>
+            <p:cNvPr id="58" name="Group 57">
+              <a:extLst>
+                <a:ext uri="{FF2B5EF4-FFF2-40B4-BE49-F238E27FC236}">
+                  <a16:creationId xmlns:a16="http://schemas.microsoft.com/office/drawing/2014/main" id="{6E86D834-382C-5147-B426-183608BCE5FD}"/>
+                </a:ext>
+              </a:extLst>
+            </p:cNvPr>
+            <p:cNvGrpSpPr/>
+            <p:nvPr/>
+          </p:nvGrpSpPr>
+          <p:grpSpPr>
+            <a:xfrm>
+              <a:off x="5130332" y="4292350"/>
+              <a:ext cx="1612247" cy="1219649"/>
+              <a:chOff x="5130332" y="4292350"/>
+              <a:chExt cx="1612247" cy="1219649"/>
+            </a:xfrm>
+          </p:grpSpPr>
+          <p:sp>
+            <p:nvSpPr>
+              <p:cNvPr id="49" name="TextBox 48">
+                <a:extLst>
+                  <a:ext uri="{FF2B5EF4-FFF2-40B4-BE49-F238E27FC236}">
+                    <a16:creationId xmlns:a16="http://schemas.microsoft.com/office/drawing/2014/main" id="{0830EC3F-1DEC-2E47-9FAD-BCD6F49E5611}"/>
+                  </a:ext>
+                </a:extLst>
+              </p:cNvPr>
+              <p:cNvSpPr txBox="1"/>
+              <p:nvPr/>
+            </p:nvSpPr>
+            <p:spPr>
+              <a:xfrm>
+                <a:off x="5188878" y="4636359"/>
+                <a:ext cx="1553701" cy="276999"/>
+              </a:xfrm>
+              <a:prstGeom prst="rect">
+                <a:avLst/>
+              </a:prstGeom>
+              <a:noFill/>
+              <a:ln>
+                <a:solidFill>
+                  <a:schemeClr val="tx1"/>
+                </a:solidFill>
+                <a:prstDash val="dash"/>
+              </a:ln>
+            </p:spPr>
+            <p:txBody>
+              <a:bodyPr wrap="square" rtlCol="0">
+                <a:spAutoFit/>
+              </a:bodyPr>
+              <a:lstStyle/>
+              <a:p>
+                <a:pPr algn="ctr"/>
+                <a:r>
+                  <a:rPr lang="en-US" sz="1200" dirty="0">
+                    <a:solidFill>
+                      <a:schemeClr val="bg2">
+                        <a:lumMod val="50000"/>
+                      </a:schemeClr>
+                    </a:solidFill>
+                  </a:rPr>
+                  <a:t>class not instantiated</a:t>
+                </a:r>
+              </a:p>
+            </p:txBody>
+          </p:sp>
+          <p:sp>
+            <p:nvSpPr>
+              <p:cNvPr id="50" name="TextBox 49">
+                <a:extLst>
+                  <a:ext uri="{FF2B5EF4-FFF2-40B4-BE49-F238E27FC236}">
+                    <a16:creationId xmlns:a16="http://schemas.microsoft.com/office/drawing/2014/main" id="{33A2CABF-ADE3-7D49-A3A2-C78758C2F669}"/>
+                  </a:ext>
+                </a:extLst>
+              </p:cNvPr>
+              <p:cNvSpPr txBox="1"/>
+              <p:nvPr/>
+            </p:nvSpPr>
+            <p:spPr>
+              <a:xfrm>
+                <a:off x="5188878" y="5235000"/>
+                <a:ext cx="1553691" cy="276999"/>
+              </a:xfrm>
+              <a:prstGeom prst="rect">
+                <a:avLst/>
+              </a:prstGeom>
+              <a:noFill/>
+              <a:ln>
+                <a:solidFill>
+                  <a:schemeClr val="tx1"/>
+                </a:solidFill>
+              </a:ln>
+            </p:spPr>
+            <p:txBody>
+              <a:bodyPr wrap="square" rtlCol="0">
+                <a:spAutoFit/>
+              </a:bodyPr>
+              <a:lstStyle/>
+              <a:p>
+                <a:pPr algn="ctr"/>
+                <a:r>
+                  <a:rPr lang="en-US" sz="1200" dirty="0"/>
+                  <a:t>class is instantiated</a:t>
+                </a:r>
+              </a:p>
+            </p:txBody>
+          </p:sp>
+          <p:cxnSp>
+            <p:nvCxnSpPr>
+              <p:cNvPr id="52" name="Straight Arrow Connector 51">
+                <a:extLst>
+                  <a:ext uri="{FF2B5EF4-FFF2-40B4-BE49-F238E27FC236}">
+                    <a16:creationId xmlns:a16="http://schemas.microsoft.com/office/drawing/2014/main" id="{EF30B336-11BC-254E-8114-4108EE792325}"/>
+                  </a:ext>
+                </a:extLst>
+              </p:cNvPr>
+              <p:cNvCxnSpPr>
+                <a:cxnSpLocks/>
+                <a:stCxn id="50" idx="0"/>
+                <a:endCxn id="49" idx="2"/>
+              </p:cNvCxnSpPr>
+              <p:nvPr/>
+            </p:nvCxnSpPr>
+            <p:spPr>
+              <a:xfrm flipV="1">
+                <a:off x="5965724" y="4913358"/>
+                <a:ext cx="5" cy="321642"/>
+              </a:xfrm>
+              <a:prstGeom prst="straightConnector1">
+                <a:avLst/>
+              </a:prstGeom>
+              <a:ln w="12700">
+                <a:solidFill>
+                  <a:schemeClr val="tx1"/>
+                </a:solidFill>
+                <a:tailEnd type="triangle"/>
+              </a:ln>
+            </p:spPr>
+            <p:style>
+              <a:lnRef idx="1">
+                <a:schemeClr val="accent1"/>
+              </a:lnRef>
+              <a:fillRef idx="0">
+                <a:schemeClr val="accent1"/>
+              </a:fillRef>
+              <a:effectRef idx="0">
+                <a:schemeClr val="accent1"/>
+              </a:effectRef>
+              <a:fontRef idx="minor">
+                <a:schemeClr val="tx1"/>
+              </a:fontRef>
+            </p:style>
+          </p:cxnSp>
+          <p:sp>
+            <p:nvSpPr>
+              <p:cNvPr id="55" name="TextBox 54">
+                <a:extLst>
+                  <a:ext uri="{FF2B5EF4-FFF2-40B4-BE49-F238E27FC236}">
+                    <a16:creationId xmlns:a16="http://schemas.microsoft.com/office/drawing/2014/main" id="{2C7E3290-745C-1B42-A5B7-82CD2F84297B}"/>
+                  </a:ext>
+                </a:extLst>
+              </p:cNvPr>
+              <p:cNvSpPr txBox="1"/>
+              <p:nvPr/>
+            </p:nvSpPr>
+            <p:spPr>
+              <a:xfrm>
+                <a:off x="5965723" y="4935679"/>
+                <a:ext cx="432274" cy="276999"/>
+              </a:xfrm>
+              <a:prstGeom prst="rect">
+                <a:avLst/>
+              </a:prstGeom>
+              <a:noFill/>
+            </p:spPr>
+            <p:txBody>
+              <a:bodyPr wrap="square" rtlCol="0">
+                <a:spAutoFit/>
+              </a:bodyPr>
+              <a:lstStyle/>
+              <a:p>
+                <a:r>
+                  <a:rPr lang="en-US" sz="1200" dirty="0"/>
+                  <a:t>is a</a:t>
+                </a:r>
+              </a:p>
+            </p:txBody>
+          </p:sp>
+          <p:sp>
+            <p:nvSpPr>
+              <p:cNvPr id="56" name="TextBox 55">
+                <a:extLst>
+                  <a:ext uri="{FF2B5EF4-FFF2-40B4-BE49-F238E27FC236}">
+                    <a16:creationId xmlns:a16="http://schemas.microsoft.com/office/drawing/2014/main" id="{E5286946-3B15-524F-8A4C-6E60AC80C62D}"/>
+                  </a:ext>
+                </a:extLst>
+              </p:cNvPr>
+              <p:cNvSpPr txBox="1"/>
+              <p:nvPr/>
+            </p:nvSpPr>
+            <p:spPr>
+              <a:xfrm>
+                <a:off x="5130332" y="4292350"/>
+                <a:ext cx="835392" cy="276999"/>
+              </a:xfrm>
+              <a:prstGeom prst="rect">
+                <a:avLst/>
+              </a:prstGeom>
+              <a:noFill/>
+            </p:spPr>
+            <p:txBody>
+              <a:bodyPr wrap="square" rtlCol="0">
+                <a:spAutoFit/>
+              </a:bodyPr>
+              <a:lstStyle/>
+              <a:p>
+                <a:r>
+                  <a:rPr lang="en-US" sz="1200" dirty="0"/>
+                  <a:t>LEGEND:</a:t>
+                </a:r>
+              </a:p>
+            </p:txBody>
+          </p:sp>
+        </p:grpSp>
+      </p:grpSp>
+    </p:spTree>
+    <p:extLst>
+      <p:ext uri="{BB962C8B-B14F-4D97-AF65-F5344CB8AC3E}">
+        <p14:creationId xmlns:p14="http://schemas.microsoft.com/office/powerpoint/2010/main" val="1090074946"/>
       </p:ext>
     </p:extLst>
   </p:cSld>

</xml_diff>

<commit_message>
added base64 version of class diagram
</commit_message>
<xml_diff>
--- a/misc/group_representation.pptx
+++ b/misc/group_representation.pptx
@@ -260,7 +260,7 @@
           <a:p>
             <a:fld id="{084E4D11-7DD8-6241-BDF9-F23E33E31776}" type="datetimeFigureOut">
               <a:rPr lang="en-US" smtClean="0"/>
-              <a:t>9/10/21</a:t>
+              <a:t>9/13/21</a:t>
             </a:fld>
             <a:endParaRPr lang="en-US"/>
           </a:p>
@@ -458,7 +458,7 @@
           <a:p>
             <a:fld id="{084E4D11-7DD8-6241-BDF9-F23E33E31776}" type="datetimeFigureOut">
               <a:rPr lang="en-US" smtClean="0"/>
-              <a:t>9/10/21</a:t>
+              <a:t>9/13/21</a:t>
             </a:fld>
             <a:endParaRPr lang="en-US"/>
           </a:p>
@@ -666,7 +666,7 @@
           <a:p>
             <a:fld id="{084E4D11-7DD8-6241-BDF9-F23E33E31776}" type="datetimeFigureOut">
               <a:rPr lang="en-US" smtClean="0"/>
-              <a:t>9/10/21</a:t>
+              <a:t>9/13/21</a:t>
             </a:fld>
             <a:endParaRPr lang="en-US"/>
           </a:p>
@@ -864,7 +864,7 @@
           <a:p>
             <a:fld id="{084E4D11-7DD8-6241-BDF9-F23E33E31776}" type="datetimeFigureOut">
               <a:rPr lang="en-US" smtClean="0"/>
-              <a:t>9/10/21</a:t>
+              <a:t>9/13/21</a:t>
             </a:fld>
             <a:endParaRPr lang="en-US"/>
           </a:p>
@@ -1139,7 +1139,7 @@
           <a:p>
             <a:fld id="{084E4D11-7DD8-6241-BDF9-F23E33E31776}" type="datetimeFigureOut">
               <a:rPr lang="en-US" smtClean="0"/>
-              <a:t>9/10/21</a:t>
+              <a:t>9/13/21</a:t>
             </a:fld>
             <a:endParaRPr lang="en-US"/>
           </a:p>
@@ -1404,7 +1404,7 @@
           <a:p>
             <a:fld id="{084E4D11-7DD8-6241-BDF9-F23E33E31776}" type="datetimeFigureOut">
               <a:rPr lang="en-US" smtClean="0"/>
-              <a:t>9/10/21</a:t>
+              <a:t>9/13/21</a:t>
             </a:fld>
             <a:endParaRPr lang="en-US"/>
           </a:p>
@@ -1816,7 +1816,7 @@
           <a:p>
             <a:fld id="{084E4D11-7DD8-6241-BDF9-F23E33E31776}" type="datetimeFigureOut">
               <a:rPr lang="en-US" smtClean="0"/>
-              <a:t>9/10/21</a:t>
+              <a:t>9/13/21</a:t>
             </a:fld>
             <a:endParaRPr lang="en-US"/>
           </a:p>
@@ -1957,7 +1957,7 @@
           <a:p>
             <a:fld id="{084E4D11-7DD8-6241-BDF9-F23E33E31776}" type="datetimeFigureOut">
               <a:rPr lang="en-US" smtClean="0"/>
-              <a:t>9/10/21</a:t>
+              <a:t>9/13/21</a:t>
             </a:fld>
             <a:endParaRPr lang="en-US"/>
           </a:p>
@@ -2070,7 +2070,7 @@
           <a:p>
             <a:fld id="{084E4D11-7DD8-6241-BDF9-F23E33E31776}" type="datetimeFigureOut">
               <a:rPr lang="en-US" smtClean="0"/>
-              <a:t>9/10/21</a:t>
+              <a:t>9/13/21</a:t>
             </a:fld>
             <a:endParaRPr lang="en-US"/>
           </a:p>
@@ -2381,7 +2381,7 @@
           <a:p>
             <a:fld id="{084E4D11-7DD8-6241-BDF9-F23E33E31776}" type="datetimeFigureOut">
               <a:rPr lang="en-US" smtClean="0"/>
-              <a:t>9/10/21</a:t>
+              <a:t>9/13/21</a:t>
             </a:fld>
             <a:endParaRPr lang="en-US"/>
           </a:p>
@@ -2669,7 +2669,7 @@
           <a:p>
             <a:fld id="{084E4D11-7DD8-6241-BDF9-F23E33E31776}" type="datetimeFigureOut">
               <a:rPr lang="en-US" smtClean="0"/>
-              <a:t>9/10/21</a:t>
+              <a:t>9/13/21</a:t>
             </a:fld>
             <a:endParaRPr lang="en-US"/>
           </a:p>
@@ -2910,7 +2910,7 @@
           <a:p>
             <a:fld id="{084E4D11-7DD8-6241-BDF9-F23E33E31776}" type="datetimeFigureOut">
               <a:rPr lang="en-US" smtClean="0"/>
-              <a:t>9/10/21</a:t>
+              <a:t>9/13/21</a:t>
             </a:fld>
             <a:endParaRPr lang="en-US"/>
           </a:p>
@@ -5072,10 +5072,10 @@
       </p:sp>
       <p:grpSp>
         <p:nvGrpSpPr>
-          <p:cNvPr id="61" name="Group 60">
+          <p:cNvPr id="33" name="Group 32">
             <a:extLst>
               <a:ext uri="{FF2B5EF4-FFF2-40B4-BE49-F238E27FC236}">
-                <a16:creationId xmlns:a16="http://schemas.microsoft.com/office/drawing/2014/main" id="{22A85D30-C1F4-3144-82B3-521AC64085C2}"/>
+                <a16:creationId xmlns:a16="http://schemas.microsoft.com/office/drawing/2014/main" id="{8AE069F1-633F-6C43-9C79-82921B711E80}"/>
               </a:ext>
             </a:extLst>
           </p:cNvPr>
@@ -5084,10 +5084,10 @@
         </p:nvGrpSpPr>
         <p:grpSpPr>
           <a:xfrm>
-            <a:off x="4741768" y="1113300"/>
-            <a:ext cx="6315642" cy="4888032"/>
-            <a:chOff x="4266638" y="1104336"/>
-            <a:chExt cx="6315642" cy="4888032"/>
+            <a:off x="4467165" y="1113300"/>
+            <a:ext cx="6405699" cy="4888032"/>
+            <a:chOff x="4467165" y="1113300"/>
+            <a:chExt cx="6405699" cy="4888032"/>
           </a:xfrm>
         </p:grpSpPr>
         <p:sp>
@@ -5104,7 +5104,7 @@
           </p:nvSpPr>
           <p:spPr>
             <a:xfrm>
-              <a:off x="6437777" y="1104336"/>
+              <a:off x="6912907" y="1113300"/>
               <a:ext cx="1555378" cy="369332"/>
             </a:xfrm>
             <a:prstGeom prst="rect">
@@ -5148,6 +5148,7 @@
               </a:extLst>
             </p:cNvPr>
             <p:cNvCxnSpPr>
+              <a:cxnSpLocks/>
               <a:stCxn id="12" idx="0"/>
               <a:endCxn id="13" idx="1"/>
             </p:cNvCxnSpPr>
@@ -5155,8 +5156,8 @@
           </p:nvCxnSpPr>
           <p:spPr>
             <a:xfrm rot="5400000" flipH="1" flipV="1">
-              <a:off x="5552424" y="1022954"/>
-              <a:ext cx="619305" cy="1151402"/>
+              <a:off x="6103087" y="1107452"/>
+              <a:ext cx="619305" cy="1000335"/>
             </a:xfrm>
             <a:prstGeom prst="bentConnector2">
               <a:avLst/>
@@ -5201,8 +5202,8 @@
           </p:nvCxnSpPr>
           <p:spPr>
             <a:xfrm rot="16200000" flipV="1">
-              <a:off x="8010436" y="1271722"/>
-              <a:ext cx="619305" cy="653866"/>
+              <a:off x="8712574" y="1053678"/>
+              <a:ext cx="619305" cy="1107881"/>
             </a:xfrm>
             <a:prstGeom prst="bentConnector2">
               <a:avLst/>
@@ -5229,12 +5230,778 @@
             </a:fontRef>
           </p:style>
         </p:cxnSp>
+        <p:sp>
+          <p:nvSpPr>
+            <p:cNvPr id="5" name="TextBox 4">
+              <a:extLst>
+                <a:ext uri="{FF2B5EF4-FFF2-40B4-BE49-F238E27FC236}">
+                  <a16:creationId xmlns:a16="http://schemas.microsoft.com/office/drawing/2014/main" id="{7611AD06-6C37-7F4A-977A-0DDCA27B154A}"/>
+                </a:ext>
+              </a:extLst>
+            </p:cNvPr>
+            <p:cNvSpPr txBox="1"/>
+            <p:nvPr/>
+          </p:nvSpPr>
+          <p:spPr>
+            <a:xfrm>
+              <a:off x="9113825" y="2536140"/>
+              <a:ext cx="950260" cy="369332"/>
+            </a:xfrm>
+            <a:prstGeom prst="rect">
+              <a:avLst/>
+            </a:prstGeom>
+            <a:noFill/>
+            <a:ln>
+              <a:solidFill>
+                <a:schemeClr val="tx1"/>
+              </a:solidFill>
+            </a:ln>
+          </p:spPr>
+          <p:txBody>
+            <a:bodyPr wrap="square" rtlCol="0">
+              <a:spAutoFit/>
+            </a:bodyPr>
+            <a:lstStyle/>
+            <a:p>
+              <a:pPr algn="ctr"/>
+              <a:r>
+                <a:rPr lang="en-US" dirty="0"/>
+                <a:t>Magma</a:t>
+              </a:r>
+            </a:p>
+          </p:txBody>
+        </p:sp>
+        <p:sp>
+          <p:nvSpPr>
+            <p:cNvPr id="6" name="TextBox 5">
+              <a:extLst>
+                <a:ext uri="{FF2B5EF4-FFF2-40B4-BE49-F238E27FC236}">
+                  <a16:creationId xmlns:a16="http://schemas.microsoft.com/office/drawing/2014/main" id="{425F538C-D18F-B748-8430-6DB1D566CED8}"/>
+                </a:ext>
+              </a:extLst>
+            </p:cNvPr>
+            <p:cNvSpPr txBox="1"/>
+            <p:nvPr/>
+          </p:nvSpPr>
+          <p:spPr>
+            <a:xfrm>
+              <a:off x="8961425" y="3155009"/>
+              <a:ext cx="1255060" cy="369332"/>
+            </a:xfrm>
+            <a:prstGeom prst="rect">
+              <a:avLst/>
+            </a:prstGeom>
+            <a:noFill/>
+            <a:ln>
+              <a:solidFill>
+                <a:schemeClr val="tx1"/>
+              </a:solidFill>
+            </a:ln>
+          </p:spPr>
+          <p:txBody>
+            <a:bodyPr wrap="square" rtlCol="0">
+              <a:spAutoFit/>
+            </a:bodyPr>
+            <a:lstStyle/>
+            <a:p>
+              <a:pPr algn="ctr"/>
+              <a:r>
+                <a:rPr lang="en-US" dirty="0"/>
+                <a:t>Semigroup</a:t>
+              </a:r>
+            </a:p>
+          </p:txBody>
+        </p:sp>
+        <p:sp>
+          <p:nvSpPr>
+            <p:cNvPr id="7" name="TextBox 6">
+              <a:extLst>
+                <a:ext uri="{FF2B5EF4-FFF2-40B4-BE49-F238E27FC236}">
+                  <a16:creationId xmlns:a16="http://schemas.microsoft.com/office/drawing/2014/main" id="{5ADF05FE-A045-6745-8C04-859A35075CF2}"/>
+                </a:ext>
+              </a:extLst>
+            </p:cNvPr>
+            <p:cNvSpPr txBox="1"/>
+            <p:nvPr/>
+          </p:nvSpPr>
+          <p:spPr>
+            <a:xfrm>
+              <a:off x="9113825" y="3773878"/>
+              <a:ext cx="950260" cy="369332"/>
+            </a:xfrm>
+            <a:prstGeom prst="rect">
+              <a:avLst/>
+            </a:prstGeom>
+            <a:noFill/>
+            <a:ln>
+              <a:solidFill>
+                <a:schemeClr val="tx1"/>
+              </a:solidFill>
+            </a:ln>
+          </p:spPr>
+          <p:txBody>
+            <a:bodyPr wrap="square" rtlCol="0">
+              <a:spAutoFit/>
+            </a:bodyPr>
+            <a:lstStyle/>
+            <a:p>
+              <a:pPr algn="ctr"/>
+              <a:r>
+                <a:rPr lang="en-US" dirty="0"/>
+                <a:t>Monoid</a:t>
+              </a:r>
+            </a:p>
+          </p:txBody>
+        </p:sp>
+        <p:sp>
+          <p:nvSpPr>
+            <p:cNvPr id="8" name="TextBox 7">
+              <a:extLst>
+                <a:ext uri="{FF2B5EF4-FFF2-40B4-BE49-F238E27FC236}">
+                  <a16:creationId xmlns:a16="http://schemas.microsoft.com/office/drawing/2014/main" id="{A6C970E0-AD34-7143-957E-260670E9C130}"/>
+                </a:ext>
+              </a:extLst>
+            </p:cNvPr>
+            <p:cNvSpPr txBox="1"/>
+            <p:nvPr/>
+          </p:nvSpPr>
+          <p:spPr>
+            <a:xfrm>
+              <a:off x="9113826" y="4394263"/>
+              <a:ext cx="950260" cy="369332"/>
+            </a:xfrm>
+            <a:prstGeom prst="rect">
+              <a:avLst/>
+            </a:prstGeom>
+            <a:noFill/>
+            <a:ln>
+              <a:solidFill>
+                <a:schemeClr val="tx1"/>
+              </a:solidFill>
+            </a:ln>
+          </p:spPr>
+          <p:txBody>
+            <a:bodyPr wrap="square" rtlCol="0">
+              <a:spAutoFit/>
+            </a:bodyPr>
+            <a:lstStyle/>
+            <a:p>
+              <a:pPr algn="ctr"/>
+              <a:r>
+                <a:rPr lang="en-US" dirty="0"/>
+                <a:t>Group</a:t>
+              </a:r>
+            </a:p>
+          </p:txBody>
+        </p:sp>
+        <p:sp>
+          <p:nvSpPr>
+            <p:cNvPr id="9" name="TextBox 8">
+              <a:extLst>
+                <a:ext uri="{FF2B5EF4-FFF2-40B4-BE49-F238E27FC236}">
+                  <a16:creationId xmlns:a16="http://schemas.microsoft.com/office/drawing/2014/main" id="{9A361C39-41AF-5349-A1FD-A0CF4DC9E80C}"/>
+                </a:ext>
+              </a:extLst>
+            </p:cNvPr>
+            <p:cNvSpPr txBox="1"/>
+            <p:nvPr/>
+          </p:nvSpPr>
+          <p:spPr>
+            <a:xfrm>
+              <a:off x="9212438" y="5013132"/>
+              <a:ext cx="753037" cy="369332"/>
+            </a:xfrm>
+            <a:prstGeom prst="rect">
+              <a:avLst/>
+            </a:prstGeom>
+            <a:noFill/>
+            <a:ln>
+              <a:solidFill>
+                <a:schemeClr val="tx1"/>
+              </a:solidFill>
+            </a:ln>
+          </p:spPr>
+          <p:txBody>
+            <a:bodyPr wrap="square" rtlCol="0">
+              <a:spAutoFit/>
+            </a:bodyPr>
+            <a:lstStyle/>
+            <a:p>
+              <a:pPr algn="ctr"/>
+              <a:r>
+                <a:rPr lang="en-US" dirty="0"/>
+                <a:t>Ring</a:t>
+              </a:r>
+            </a:p>
+          </p:txBody>
+        </p:sp>
+        <p:sp>
+          <p:nvSpPr>
+            <p:cNvPr id="10" name="TextBox 9">
+              <a:extLst>
+                <a:ext uri="{FF2B5EF4-FFF2-40B4-BE49-F238E27FC236}">
+                  <a16:creationId xmlns:a16="http://schemas.microsoft.com/office/drawing/2014/main" id="{B19115DF-D4EF-C74C-80A0-6F8E6B23EBBF}"/>
+                </a:ext>
+              </a:extLst>
+            </p:cNvPr>
+            <p:cNvSpPr txBox="1"/>
+            <p:nvPr/>
+          </p:nvSpPr>
+          <p:spPr>
+            <a:xfrm>
+              <a:off x="9212438" y="5632000"/>
+              <a:ext cx="753037" cy="369332"/>
+            </a:xfrm>
+            <a:prstGeom prst="rect">
+              <a:avLst/>
+            </a:prstGeom>
+            <a:noFill/>
+            <a:ln>
+              <a:solidFill>
+                <a:schemeClr val="tx1"/>
+              </a:solidFill>
+            </a:ln>
+          </p:spPr>
+          <p:txBody>
+            <a:bodyPr wrap="square" rtlCol="0">
+              <a:spAutoFit/>
+            </a:bodyPr>
+            <a:lstStyle/>
+            <a:p>
+              <a:pPr algn="ctr"/>
+              <a:r>
+                <a:rPr lang="en-US" dirty="0"/>
+                <a:t>Field</a:t>
+              </a:r>
+            </a:p>
+          </p:txBody>
+        </p:sp>
+        <p:sp>
+          <p:nvSpPr>
+            <p:cNvPr id="11" name="TextBox 10">
+              <a:extLst>
+                <a:ext uri="{FF2B5EF4-FFF2-40B4-BE49-F238E27FC236}">
+                  <a16:creationId xmlns:a16="http://schemas.microsoft.com/office/drawing/2014/main" id="{7D16A718-6130-AD41-A15A-7C75C84ED431}"/>
+                </a:ext>
+              </a:extLst>
+            </p:cNvPr>
+            <p:cNvSpPr txBox="1"/>
+            <p:nvPr/>
+          </p:nvSpPr>
+          <p:spPr>
+            <a:xfrm>
+              <a:off x="8279467" y="1917271"/>
+              <a:ext cx="2593397" cy="369332"/>
+            </a:xfrm>
+            <a:prstGeom prst="rect">
+              <a:avLst/>
+            </a:prstGeom>
+            <a:noFill/>
+            <a:ln>
+              <a:solidFill>
+                <a:schemeClr val="tx1"/>
+              </a:solidFill>
+              <a:prstDash val="dash"/>
+            </a:ln>
+          </p:spPr>
+          <p:txBody>
+            <a:bodyPr wrap="square" rtlCol="0">
+              <a:spAutoFit/>
+            </a:bodyPr>
+            <a:lstStyle/>
+            <a:p>
+              <a:pPr algn="ctr"/>
+              <a:r>
+                <a:rPr lang="en-US" dirty="0"/>
+                <a:t>SingleElementSetAlgebra</a:t>
+              </a:r>
+              <a:endParaRPr lang="en-US" dirty="0">
+                <a:solidFill>
+                  <a:schemeClr val="bg2">
+                    <a:lumMod val="50000"/>
+                  </a:schemeClr>
+                </a:solidFill>
+              </a:endParaRPr>
+            </a:p>
+          </p:txBody>
+        </p:sp>
+        <p:cxnSp>
+          <p:nvCxnSpPr>
+            <p:cNvPr id="17" name="Straight Arrow Connector 16">
+              <a:extLst>
+                <a:ext uri="{FF2B5EF4-FFF2-40B4-BE49-F238E27FC236}">
+                  <a16:creationId xmlns:a16="http://schemas.microsoft.com/office/drawing/2014/main" id="{531E1E9C-6DA2-454B-B8BE-4F668ACB682E}"/>
+                </a:ext>
+              </a:extLst>
+            </p:cNvPr>
+            <p:cNvCxnSpPr/>
+            <p:nvPr/>
+          </p:nvCxnSpPr>
+          <p:spPr>
+            <a:xfrm flipV="1">
+              <a:off x="9582231" y="2904736"/>
+              <a:ext cx="0" cy="250273"/>
+            </a:xfrm>
+            <a:prstGeom prst="straightConnector1">
+              <a:avLst/>
+            </a:prstGeom>
+            <a:ln w="12700">
+              <a:solidFill>
+                <a:schemeClr val="tx1"/>
+              </a:solidFill>
+              <a:tailEnd type="triangle"/>
+            </a:ln>
+          </p:spPr>
+          <p:style>
+            <a:lnRef idx="1">
+              <a:schemeClr val="accent1"/>
+            </a:lnRef>
+            <a:fillRef idx="0">
+              <a:schemeClr val="accent1"/>
+            </a:fillRef>
+            <a:effectRef idx="0">
+              <a:schemeClr val="accent1"/>
+            </a:effectRef>
+            <a:fontRef idx="minor">
+              <a:schemeClr val="tx1"/>
+            </a:fontRef>
+          </p:style>
+        </p:cxnSp>
+        <p:cxnSp>
+          <p:nvCxnSpPr>
+            <p:cNvPr id="18" name="Straight Arrow Connector 17">
+              <a:extLst>
+                <a:ext uri="{FF2B5EF4-FFF2-40B4-BE49-F238E27FC236}">
+                  <a16:creationId xmlns:a16="http://schemas.microsoft.com/office/drawing/2014/main" id="{9C3E105D-9706-1540-8683-BF62B1F3164D}"/>
+                </a:ext>
+              </a:extLst>
+            </p:cNvPr>
+            <p:cNvCxnSpPr/>
+            <p:nvPr/>
+          </p:nvCxnSpPr>
+          <p:spPr>
+            <a:xfrm flipV="1">
+              <a:off x="9582231" y="2285867"/>
+              <a:ext cx="0" cy="250273"/>
+            </a:xfrm>
+            <a:prstGeom prst="straightConnector1">
+              <a:avLst/>
+            </a:prstGeom>
+            <a:ln w="12700">
+              <a:solidFill>
+                <a:schemeClr val="tx1"/>
+              </a:solidFill>
+              <a:tailEnd type="triangle"/>
+            </a:ln>
+          </p:spPr>
+          <p:style>
+            <a:lnRef idx="1">
+              <a:schemeClr val="accent1"/>
+            </a:lnRef>
+            <a:fillRef idx="0">
+              <a:schemeClr val="accent1"/>
+            </a:fillRef>
+            <a:effectRef idx="0">
+              <a:schemeClr val="accent1"/>
+            </a:effectRef>
+            <a:fontRef idx="minor">
+              <a:schemeClr val="tx1"/>
+            </a:fontRef>
+          </p:style>
+        </p:cxnSp>
+        <p:cxnSp>
+          <p:nvCxnSpPr>
+            <p:cNvPr id="19" name="Straight Arrow Connector 18">
+              <a:extLst>
+                <a:ext uri="{FF2B5EF4-FFF2-40B4-BE49-F238E27FC236}">
+                  <a16:creationId xmlns:a16="http://schemas.microsoft.com/office/drawing/2014/main" id="{0BC6307A-9345-6340-A679-C30B2B11F6DA}"/>
+                </a:ext>
+              </a:extLst>
+            </p:cNvPr>
+            <p:cNvCxnSpPr/>
+            <p:nvPr/>
+          </p:nvCxnSpPr>
+          <p:spPr>
+            <a:xfrm flipV="1">
+              <a:off x="9582231" y="3523605"/>
+              <a:ext cx="0" cy="250273"/>
+            </a:xfrm>
+            <a:prstGeom prst="straightConnector1">
+              <a:avLst/>
+            </a:prstGeom>
+            <a:ln w="12700">
+              <a:solidFill>
+                <a:schemeClr val="tx1"/>
+              </a:solidFill>
+              <a:tailEnd type="triangle"/>
+            </a:ln>
+          </p:spPr>
+          <p:style>
+            <a:lnRef idx="1">
+              <a:schemeClr val="accent1"/>
+            </a:lnRef>
+            <a:fillRef idx="0">
+              <a:schemeClr val="accent1"/>
+            </a:fillRef>
+            <a:effectRef idx="0">
+              <a:schemeClr val="accent1"/>
+            </a:effectRef>
+            <a:fontRef idx="minor">
+              <a:schemeClr val="tx1"/>
+            </a:fontRef>
+          </p:style>
+        </p:cxnSp>
+        <p:cxnSp>
+          <p:nvCxnSpPr>
+            <p:cNvPr id="20" name="Straight Arrow Connector 19">
+              <a:extLst>
+                <a:ext uri="{FF2B5EF4-FFF2-40B4-BE49-F238E27FC236}">
+                  <a16:creationId xmlns:a16="http://schemas.microsoft.com/office/drawing/2014/main" id="{1F07E47C-BE41-EC4E-A857-45958E82C647}"/>
+                </a:ext>
+              </a:extLst>
+            </p:cNvPr>
+            <p:cNvCxnSpPr/>
+            <p:nvPr/>
+          </p:nvCxnSpPr>
+          <p:spPr>
+            <a:xfrm flipV="1">
+              <a:off x="9582231" y="4143210"/>
+              <a:ext cx="0" cy="250273"/>
+            </a:xfrm>
+            <a:prstGeom prst="straightConnector1">
+              <a:avLst/>
+            </a:prstGeom>
+            <a:ln w="12700">
+              <a:solidFill>
+                <a:schemeClr val="tx1"/>
+              </a:solidFill>
+              <a:tailEnd type="triangle"/>
+            </a:ln>
+          </p:spPr>
+          <p:style>
+            <a:lnRef idx="1">
+              <a:schemeClr val="accent1"/>
+            </a:lnRef>
+            <a:fillRef idx="0">
+              <a:schemeClr val="accent1"/>
+            </a:fillRef>
+            <a:effectRef idx="0">
+              <a:schemeClr val="accent1"/>
+            </a:effectRef>
+            <a:fontRef idx="minor">
+              <a:schemeClr val="tx1"/>
+            </a:fontRef>
+          </p:style>
+        </p:cxnSp>
+        <p:cxnSp>
+          <p:nvCxnSpPr>
+            <p:cNvPr id="21" name="Straight Arrow Connector 20">
+              <a:extLst>
+                <a:ext uri="{FF2B5EF4-FFF2-40B4-BE49-F238E27FC236}">
+                  <a16:creationId xmlns:a16="http://schemas.microsoft.com/office/drawing/2014/main" id="{075623BA-FD7E-FA49-A8C8-84FFAB19A5BC}"/>
+                </a:ext>
+              </a:extLst>
+            </p:cNvPr>
+            <p:cNvCxnSpPr/>
+            <p:nvPr/>
+          </p:nvCxnSpPr>
+          <p:spPr>
+            <a:xfrm flipV="1">
+              <a:off x="9582232" y="4762859"/>
+              <a:ext cx="0" cy="250273"/>
+            </a:xfrm>
+            <a:prstGeom prst="straightConnector1">
+              <a:avLst/>
+            </a:prstGeom>
+            <a:ln w="12700">
+              <a:solidFill>
+                <a:schemeClr val="tx1"/>
+              </a:solidFill>
+              <a:tailEnd type="triangle"/>
+            </a:ln>
+          </p:spPr>
+          <p:style>
+            <a:lnRef idx="1">
+              <a:schemeClr val="accent1"/>
+            </a:lnRef>
+            <a:fillRef idx="0">
+              <a:schemeClr val="accent1"/>
+            </a:fillRef>
+            <a:effectRef idx="0">
+              <a:schemeClr val="accent1"/>
+            </a:effectRef>
+            <a:fontRef idx="minor">
+              <a:schemeClr val="tx1"/>
+            </a:fontRef>
+          </p:style>
+        </p:cxnSp>
+        <p:cxnSp>
+          <p:nvCxnSpPr>
+            <p:cNvPr id="22" name="Straight Arrow Connector 21">
+              <a:extLst>
+                <a:ext uri="{FF2B5EF4-FFF2-40B4-BE49-F238E27FC236}">
+                  <a16:creationId xmlns:a16="http://schemas.microsoft.com/office/drawing/2014/main" id="{0C26E0E3-0909-AE4C-8827-4159EABF2992}"/>
+                </a:ext>
+              </a:extLst>
+            </p:cNvPr>
+            <p:cNvCxnSpPr/>
+            <p:nvPr/>
+          </p:nvCxnSpPr>
+          <p:spPr>
+            <a:xfrm flipV="1">
+              <a:off x="9582232" y="5382464"/>
+              <a:ext cx="0" cy="250273"/>
+            </a:xfrm>
+            <a:prstGeom prst="straightConnector1">
+              <a:avLst/>
+            </a:prstGeom>
+            <a:ln w="12700">
+              <a:solidFill>
+                <a:schemeClr val="tx1"/>
+              </a:solidFill>
+              <a:tailEnd type="triangle"/>
+            </a:ln>
+          </p:spPr>
+          <p:style>
+            <a:lnRef idx="1">
+              <a:schemeClr val="accent1"/>
+            </a:lnRef>
+            <a:fillRef idx="0">
+              <a:schemeClr val="accent1"/>
+            </a:fillRef>
+            <a:effectRef idx="0">
+              <a:schemeClr val="accent1"/>
+            </a:effectRef>
+            <a:fontRef idx="minor">
+              <a:schemeClr val="tx1"/>
+            </a:fontRef>
+          </p:style>
+        </p:cxnSp>
+        <p:sp>
+          <p:nvSpPr>
+            <p:cNvPr id="3" name="TextBox 2">
+              <a:extLst>
+                <a:ext uri="{FF2B5EF4-FFF2-40B4-BE49-F238E27FC236}">
+                  <a16:creationId xmlns:a16="http://schemas.microsoft.com/office/drawing/2014/main" id="{F1AD1DAA-B8CC-4741-B579-50D339A84149}"/>
+                </a:ext>
+              </a:extLst>
+            </p:cNvPr>
+            <p:cNvSpPr txBox="1"/>
+            <p:nvPr/>
+          </p:nvSpPr>
+          <p:spPr>
+            <a:xfrm>
+              <a:off x="5168501" y="3155009"/>
+              <a:ext cx="1488142" cy="369332"/>
+            </a:xfrm>
+            <a:prstGeom prst="rect">
+              <a:avLst/>
+            </a:prstGeom>
+            <a:noFill/>
+            <a:ln>
+              <a:solidFill>
+                <a:schemeClr val="tx1"/>
+              </a:solidFill>
+            </a:ln>
+          </p:spPr>
+          <p:txBody>
+            <a:bodyPr wrap="square" rtlCol="0">
+              <a:spAutoFit/>
+            </a:bodyPr>
+            <a:lstStyle/>
+            <a:p>
+              <a:pPr algn="ctr"/>
+              <a:r>
+                <a:rPr lang="en-US" dirty="0"/>
+                <a:t>VectorSpace</a:t>
+              </a:r>
+            </a:p>
+          </p:txBody>
+        </p:sp>
+        <p:sp>
+          <p:nvSpPr>
+            <p:cNvPr id="4" name="TextBox 3">
+              <a:extLst>
+                <a:ext uri="{FF2B5EF4-FFF2-40B4-BE49-F238E27FC236}">
+                  <a16:creationId xmlns:a16="http://schemas.microsoft.com/office/drawing/2014/main" id="{AF2ED9AD-ACB8-2343-B41E-FCA9A39C59CD}"/>
+                </a:ext>
+              </a:extLst>
+            </p:cNvPr>
+            <p:cNvSpPr txBox="1"/>
+            <p:nvPr/>
+          </p:nvSpPr>
+          <p:spPr>
+            <a:xfrm>
+              <a:off x="5419513" y="2536876"/>
+              <a:ext cx="986119" cy="369332"/>
+            </a:xfrm>
+            <a:prstGeom prst="rect">
+              <a:avLst/>
+            </a:prstGeom>
+            <a:noFill/>
+            <a:ln>
+              <a:solidFill>
+                <a:schemeClr val="tx1"/>
+              </a:solidFill>
+            </a:ln>
+          </p:spPr>
+          <p:txBody>
+            <a:bodyPr wrap="square" rtlCol="0">
+              <a:spAutoFit/>
+            </a:bodyPr>
+            <a:lstStyle/>
+            <a:p>
+              <a:pPr algn="ctr"/>
+              <a:r>
+                <a:rPr lang="en-US" dirty="0"/>
+                <a:t>Module</a:t>
+              </a:r>
+            </a:p>
+          </p:txBody>
+        </p:sp>
+        <p:sp>
+          <p:nvSpPr>
+            <p:cNvPr id="12" name="TextBox 11">
+              <a:extLst>
+                <a:ext uri="{FF2B5EF4-FFF2-40B4-BE49-F238E27FC236}">
+                  <a16:creationId xmlns:a16="http://schemas.microsoft.com/office/drawing/2014/main" id="{A6729132-0692-EC44-8603-F45E2513B144}"/>
+                </a:ext>
+              </a:extLst>
+            </p:cNvPr>
+            <p:cNvSpPr txBox="1"/>
+            <p:nvPr/>
+          </p:nvSpPr>
+          <p:spPr>
+            <a:xfrm>
+              <a:off x="4467165" y="1917271"/>
+              <a:ext cx="2890813" cy="369332"/>
+            </a:xfrm>
+            <a:prstGeom prst="rect">
+              <a:avLst/>
+            </a:prstGeom>
+            <a:noFill/>
+            <a:ln>
+              <a:solidFill>
+                <a:schemeClr val="tx1"/>
+              </a:solidFill>
+              <a:prstDash val="dash"/>
+            </a:ln>
+          </p:spPr>
+          <p:txBody>
+            <a:bodyPr wrap="square" rtlCol="0">
+              <a:spAutoFit/>
+            </a:bodyPr>
+            <a:lstStyle/>
+            <a:p>
+              <a:pPr algn="ctr"/>
+              <a:r>
+                <a:rPr lang="en-US" dirty="0"/>
+                <a:t>MultipleElementSetAlgebra</a:t>
+              </a:r>
+              <a:endParaRPr lang="en-US" dirty="0">
+                <a:solidFill>
+                  <a:schemeClr val="bg2">
+                    <a:lumMod val="50000"/>
+                  </a:schemeClr>
+                </a:solidFill>
+              </a:endParaRPr>
+            </a:p>
+          </p:txBody>
+        </p:sp>
+        <p:cxnSp>
+          <p:nvCxnSpPr>
+            <p:cNvPr id="15" name="Straight Arrow Connector 14">
+              <a:extLst>
+                <a:ext uri="{FF2B5EF4-FFF2-40B4-BE49-F238E27FC236}">
+                  <a16:creationId xmlns:a16="http://schemas.microsoft.com/office/drawing/2014/main" id="{DB8A980A-C926-5241-ABC6-5306A7D5948F}"/>
+                </a:ext>
+              </a:extLst>
+            </p:cNvPr>
+            <p:cNvCxnSpPr>
+              <a:cxnSpLocks/>
+              <a:stCxn id="4" idx="0"/>
+              <a:endCxn id="12" idx="2"/>
+            </p:cNvCxnSpPr>
+            <p:nvPr/>
+          </p:nvCxnSpPr>
+          <p:spPr>
+            <a:xfrm flipH="1" flipV="1">
+              <a:off x="5912572" y="2286603"/>
+              <a:ext cx="1" cy="250273"/>
+            </a:xfrm>
+            <a:prstGeom prst="straightConnector1">
+              <a:avLst/>
+            </a:prstGeom>
+            <a:ln w="12700">
+              <a:solidFill>
+                <a:schemeClr val="tx1"/>
+              </a:solidFill>
+              <a:tailEnd type="triangle"/>
+            </a:ln>
+          </p:spPr>
+          <p:style>
+            <a:lnRef idx="1">
+              <a:schemeClr val="accent1"/>
+            </a:lnRef>
+            <a:fillRef idx="0">
+              <a:schemeClr val="accent1"/>
+            </a:fillRef>
+            <a:effectRef idx="0">
+              <a:schemeClr val="accent1"/>
+            </a:effectRef>
+            <a:fontRef idx="minor">
+              <a:schemeClr val="tx1"/>
+            </a:fontRef>
+          </p:style>
+        </p:cxnSp>
+        <p:cxnSp>
+          <p:nvCxnSpPr>
+            <p:cNvPr id="16" name="Straight Arrow Connector 15">
+              <a:extLst>
+                <a:ext uri="{FF2B5EF4-FFF2-40B4-BE49-F238E27FC236}">
+                  <a16:creationId xmlns:a16="http://schemas.microsoft.com/office/drawing/2014/main" id="{EBC6DA3B-9B3F-3A4A-9910-25CE75BCDD9B}"/>
+                </a:ext>
+              </a:extLst>
+            </p:cNvPr>
+            <p:cNvCxnSpPr/>
+            <p:nvPr/>
+          </p:nvCxnSpPr>
+          <p:spPr>
+            <a:xfrm flipV="1">
+              <a:off x="5912573" y="2904736"/>
+              <a:ext cx="0" cy="250273"/>
+            </a:xfrm>
+            <a:prstGeom prst="straightConnector1">
+              <a:avLst/>
+            </a:prstGeom>
+            <a:ln w="12700">
+              <a:solidFill>
+                <a:schemeClr val="tx1"/>
+              </a:solidFill>
+              <a:tailEnd type="triangle"/>
+            </a:ln>
+          </p:spPr>
+          <p:style>
+            <a:lnRef idx="1">
+              <a:schemeClr val="accent1"/>
+            </a:lnRef>
+            <a:fillRef idx="0">
+              <a:schemeClr val="accent1"/>
+            </a:fillRef>
+            <a:effectRef idx="0">
+              <a:schemeClr val="accent1"/>
+            </a:effectRef>
+            <a:fontRef idx="minor">
+              <a:schemeClr val="tx1"/>
+            </a:fontRef>
+          </p:style>
+        </p:cxnSp>
         <p:grpSp>
           <p:nvGrpSpPr>
-            <p:cNvPr id="60" name="Group 59">
+            <p:cNvPr id="32" name="Group 31">
               <a:extLst>
                 <a:ext uri="{FF2B5EF4-FFF2-40B4-BE49-F238E27FC236}">
-                  <a16:creationId xmlns:a16="http://schemas.microsoft.com/office/drawing/2014/main" id="{3DCBDCC1-0F2B-2442-A5A5-51B5D373ED78}"/>
+                  <a16:creationId xmlns:a16="http://schemas.microsoft.com/office/drawing/2014/main" id="{E43B775C-CC26-EE42-8156-10BF008443E9}"/>
                 </a:ext>
               </a:extLst>
             </p:cNvPr>
@@ -5243,884 +6010,9 @@
           </p:nvGrpSpPr>
           <p:grpSpPr>
             <a:xfrm>
-              <a:off x="7804337" y="1631139"/>
-              <a:ext cx="2777943" cy="4361229"/>
-              <a:chOff x="7804337" y="1631139"/>
-              <a:chExt cx="2777943" cy="4361229"/>
-            </a:xfrm>
-          </p:grpSpPr>
-          <p:sp>
-            <p:nvSpPr>
-              <p:cNvPr id="5" name="TextBox 4">
-                <a:extLst>
-                  <a:ext uri="{FF2B5EF4-FFF2-40B4-BE49-F238E27FC236}">
-                    <a16:creationId xmlns:a16="http://schemas.microsoft.com/office/drawing/2014/main" id="{7611AD06-6C37-7F4A-977A-0DDCA27B154A}"/>
-                  </a:ext>
-                </a:extLst>
-              </p:cNvPr>
-              <p:cNvSpPr txBox="1"/>
-              <p:nvPr/>
-            </p:nvSpPr>
-            <p:spPr>
-              <a:xfrm>
-                <a:off x="8171890" y="2527176"/>
-                <a:ext cx="950260" cy="369332"/>
-              </a:xfrm>
-              <a:prstGeom prst="rect">
-                <a:avLst/>
-              </a:prstGeom>
-              <a:noFill/>
-              <a:ln>
-                <a:solidFill>
-                  <a:schemeClr val="tx1"/>
-                </a:solidFill>
-              </a:ln>
-            </p:spPr>
-            <p:txBody>
-              <a:bodyPr wrap="square" rtlCol="0">
-                <a:spAutoFit/>
-              </a:bodyPr>
-              <a:lstStyle/>
-              <a:p>
-                <a:pPr algn="ctr"/>
-                <a:r>
-                  <a:rPr lang="en-US" dirty="0"/>
-                  <a:t>Magma</a:t>
-                </a:r>
-              </a:p>
-            </p:txBody>
-          </p:sp>
-          <p:sp>
-            <p:nvSpPr>
-              <p:cNvPr id="6" name="TextBox 5">
-                <a:extLst>
-                  <a:ext uri="{FF2B5EF4-FFF2-40B4-BE49-F238E27FC236}">
-                    <a16:creationId xmlns:a16="http://schemas.microsoft.com/office/drawing/2014/main" id="{425F538C-D18F-B748-8430-6DB1D566CED8}"/>
-                  </a:ext>
-                </a:extLst>
-              </p:cNvPr>
-              <p:cNvSpPr txBox="1"/>
-              <p:nvPr/>
-            </p:nvSpPr>
-            <p:spPr>
-              <a:xfrm>
-                <a:off x="8019490" y="3146045"/>
-                <a:ext cx="1255060" cy="369332"/>
-              </a:xfrm>
-              <a:prstGeom prst="rect">
-                <a:avLst/>
-              </a:prstGeom>
-              <a:noFill/>
-              <a:ln>
-                <a:solidFill>
-                  <a:schemeClr val="tx1"/>
-                </a:solidFill>
-              </a:ln>
-            </p:spPr>
-            <p:txBody>
-              <a:bodyPr wrap="square" rtlCol="0">
-                <a:spAutoFit/>
-              </a:bodyPr>
-              <a:lstStyle/>
-              <a:p>
-                <a:pPr algn="ctr"/>
-                <a:r>
-                  <a:rPr lang="en-US" dirty="0"/>
-                  <a:t>Semigroup</a:t>
-                </a:r>
-              </a:p>
-            </p:txBody>
-          </p:sp>
-          <p:sp>
-            <p:nvSpPr>
-              <p:cNvPr id="7" name="TextBox 6">
-                <a:extLst>
-                  <a:ext uri="{FF2B5EF4-FFF2-40B4-BE49-F238E27FC236}">
-                    <a16:creationId xmlns:a16="http://schemas.microsoft.com/office/drawing/2014/main" id="{5ADF05FE-A045-6745-8C04-859A35075CF2}"/>
-                  </a:ext>
-                </a:extLst>
-              </p:cNvPr>
-              <p:cNvSpPr txBox="1"/>
-              <p:nvPr/>
-            </p:nvSpPr>
-            <p:spPr>
-              <a:xfrm>
-                <a:off x="8171890" y="3764914"/>
-                <a:ext cx="950260" cy="369332"/>
-              </a:xfrm>
-              <a:prstGeom prst="rect">
-                <a:avLst/>
-              </a:prstGeom>
-              <a:noFill/>
-              <a:ln>
-                <a:solidFill>
-                  <a:schemeClr val="tx1"/>
-                </a:solidFill>
-              </a:ln>
-            </p:spPr>
-            <p:txBody>
-              <a:bodyPr wrap="square" rtlCol="0">
-                <a:spAutoFit/>
-              </a:bodyPr>
-              <a:lstStyle/>
-              <a:p>
-                <a:pPr algn="ctr"/>
-                <a:r>
-                  <a:rPr lang="en-US" dirty="0"/>
-                  <a:t>Monoid</a:t>
-                </a:r>
-              </a:p>
-            </p:txBody>
-          </p:sp>
-          <p:sp>
-            <p:nvSpPr>
-              <p:cNvPr id="8" name="TextBox 7">
-                <a:extLst>
-                  <a:ext uri="{FF2B5EF4-FFF2-40B4-BE49-F238E27FC236}">
-                    <a16:creationId xmlns:a16="http://schemas.microsoft.com/office/drawing/2014/main" id="{A6C970E0-AD34-7143-957E-260670E9C130}"/>
-                  </a:ext>
-                </a:extLst>
-              </p:cNvPr>
-              <p:cNvSpPr txBox="1"/>
-              <p:nvPr/>
-            </p:nvSpPr>
-            <p:spPr>
-              <a:xfrm>
-                <a:off x="8171891" y="4385299"/>
-                <a:ext cx="950260" cy="369332"/>
-              </a:xfrm>
-              <a:prstGeom prst="rect">
-                <a:avLst/>
-              </a:prstGeom>
-              <a:noFill/>
-              <a:ln>
-                <a:solidFill>
-                  <a:schemeClr val="tx1"/>
-                </a:solidFill>
-              </a:ln>
-            </p:spPr>
-            <p:txBody>
-              <a:bodyPr wrap="square" rtlCol="0">
-                <a:spAutoFit/>
-              </a:bodyPr>
-              <a:lstStyle/>
-              <a:p>
-                <a:pPr algn="ctr"/>
-                <a:r>
-                  <a:rPr lang="en-US" dirty="0"/>
-                  <a:t>Group</a:t>
-                </a:r>
-              </a:p>
-            </p:txBody>
-          </p:sp>
-          <p:sp>
-            <p:nvSpPr>
-              <p:cNvPr id="9" name="TextBox 8">
-                <a:extLst>
-                  <a:ext uri="{FF2B5EF4-FFF2-40B4-BE49-F238E27FC236}">
-                    <a16:creationId xmlns:a16="http://schemas.microsoft.com/office/drawing/2014/main" id="{9A361C39-41AF-5349-A1FD-A0CF4DC9E80C}"/>
-                  </a:ext>
-                </a:extLst>
-              </p:cNvPr>
-              <p:cNvSpPr txBox="1"/>
-              <p:nvPr/>
-            </p:nvSpPr>
-            <p:spPr>
-              <a:xfrm>
-                <a:off x="8270503" y="5004168"/>
-                <a:ext cx="753037" cy="369332"/>
-              </a:xfrm>
-              <a:prstGeom prst="rect">
-                <a:avLst/>
-              </a:prstGeom>
-              <a:noFill/>
-              <a:ln>
-                <a:solidFill>
-                  <a:schemeClr val="tx1"/>
-                </a:solidFill>
-              </a:ln>
-            </p:spPr>
-            <p:txBody>
-              <a:bodyPr wrap="square" rtlCol="0">
-                <a:spAutoFit/>
-              </a:bodyPr>
-              <a:lstStyle/>
-              <a:p>
-                <a:pPr algn="ctr"/>
-                <a:r>
-                  <a:rPr lang="en-US" dirty="0"/>
-                  <a:t>Ring</a:t>
-                </a:r>
-              </a:p>
-            </p:txBody>
-          </p:sp>
-          <p:sp>
-            <p:nvSpPr>
-              <p:cNvPr id="10" name="TextBox 9">
-                <a:extLst>
-                  <a:ext uri="{FF2B5EF4-FFF2-40B4-BE49-F238E27FC236}">
-                    <a16:creationId xmlns:a16="http://schemas.microsoft.com/office/drawing/2014/main" id="{B19115DF-D4EF-C74C-80A0-6F8E6B23EBBF}"/>
-                  </a:ext>
-                </a:extLst>
-              </p:cNvPr>
-              <p:cNvSpPr txBox="1"/>
-              <p:nvPr/>
-            </p:nvSpPr>
-            <p:spPr>
-              <a:xfrm>
-                <a:off x="8270503" y="5623036"/>
-                <a:ext cx="753037" cy="369332"/>
-              </a:xfrm>
-              <a:prstGeom prst="rect">
-                <a:avLst/>
-              </a:prstGeom>
-              <a:noFill/>
-              <a:ln>
-                <a:solidFill>
-                  <a:schemeClr val="tx1"/>
-                </a:solidFill>
-              </a:ln>
-            </p:spPr>
-            <p:txBody>
-              <a:bodyPr wrap="square" rtlCol="0">
-                <a:spAutoFit/>
-              </a:bodyPr>
-              <a:lstStyle/>
-              <a:p>
-                <a:pPr algn="ctr"/>
-                <a:r>
-                  <a:rPr lang="en-US" dirty="0"/>
-                  <a:t>Field</a:t>
-                </a:r>
-              </a:p>
-            </p:txBody>
-          </p:sp>
-          <p:sp>
-            <p:nvSpPr>
-              <p:cNvPr id="11" name="TextBox 10">
-                <a:extLst>
-                  <a:ext uri="{FF2B5EF4-FFF2-40B4-BE49-F238E27FC236}">
-                    <a16:creationId xmlns:a16="http://schemas.microsoft.com/office/drawing/2014/main" id="{7D16A718-6130-AD41-A15A-7C75C84ED431}"/>
-                  </a:ext>
-                </a:extLst>
-              </p:cNvPr>
-              <p:cNvSpPr txBox="1"/>
-              <p:nvPr/>
-            </p:nvSpPr>
-            <p:spPr>
-              <a:xfrm>
-                <a:off x="7804337" y="1908307"/>
-                <a:ext cx="1685367" cy="369332"/>
-              </a:xfrm>
-              <a:prstGeom prst="rect">
-                <a:avLst/>
-              </a:prstGeom>
-              <a:noFill/>
-              <a:ln>
-                <a:solidFill>
-                  <a:schemeClr val="tx1"/>
-                </a:solidFill>
-                <a:prstDash val="dash"/>
-              </a:ln>
-            </p:spPr>
-            <p:txBody>
-              <a:bodyPr wrap="square" rtlCol="0">
-                <a:spAutoFit/>
-              </a:bodyPr>
-              <a:lstStyle/>
-              <a:p>
-                <a:pPr algn="ctr"/>
-                <a:r>
-                  <a:rPr lang="en-US" dirty="0">
-                    <a:solidFill>
-                      <a:schemeClr val="bg2">
-                        <a:lumMod val="50000"/>
-                      </a:schemeClr>
-                    </a:solidFill>
-                  </a:rPr>
-                  <a:t>SimpleAlgebra</a:t>
-                </a:r>
-              </a:p>
-            </p:txBody>
-          </p:sp>
-          <p:cxnSp>
-            <p:nvCxnSpPr>
-              <p:cNvPr id="17" name="Straight Arrow Connector 16">
-                <a:extLst>
-                  <a:ext uri="{FF2B5EF4-FFF2-40B4-BE49-F238E27FC236}">
-                    <a16:creationId xmlns:a16="http://schemas.microsoft.com/office/drawing/2014/main" id="{531E1E9C-6DA2-454B-B8BE-4F668ACB682E}"/>
-                  </a:ext>
-                </a:extLst>
-              </p:cNvPr>
-              <p:cNvCxnSpPr/>
-              <p:nvPr/>
-            </p:nvCxnSpPr>
-            <p:spPr>
-              <a:xfrm flipV="1">
-                <a:off x="8640296" y="2895772"/>
-                <a:ext cx="0" cy="250273"/>
-              </a:xfrm>
-              <a:prstGeom prst="straightConnector1">
-                <a:avLst/>
-              </a:prstGeom>
-              <a:ln w="12700">
-                <a:solidFill>
-                  <a:schemeClr val="tx1"/>
-                </a:solidFill>
-                <a:tailEnd type="triangle"/>
-              </a:ln>
-            </p:spPr>
-            <p:style>
-              <a:lnRef idx="1">
-                <a:schemeClr val="accent1"/>
-              </a:lnRef>
-              <a:fillRef idx="0">
-                <a:schemeClr val="accent1"/>
-              </a:fillRef>
-              <a:effectRef idx="0">
-                <a:schemeClr val="accent1"/>
-              </a:effectRef>
-              <a:fontRef idx="minor">
-                <a:schemeClr val="tx1"/>
-              </a:fontRef>
-            </p:style>
-          </p:cxnSp>
-          <p:cxnSp>
-            <p:nvCxnSpPr>
-              <p:cNvPr id="18" name="Straight Arrow Connector 17">
-                <a:extLst>
-                  <a:ext uri="{FF2B5EF4-FFF2-40B4-BE49-F238E27FC236}">
-                    <a16:creationId xmlns:a16="http://schemas.microsoft.com/office/drawing/2014/main" id="{9C3E105D-9706-1540-8683-BF62B1F3164D}"/>
-                  </a:ext>
-                </a:extLst>
-              </p:cNvPr>
-              <p:cNvCxnSpPr/>
-              <p:nvPr/>
-            </p:nvCxnSpPr>
-            <p:spPr>
-              <a:xfrm flipV="1">
-                <a:off x="8640296" y="2276903"/>
-                <a:ext cx="0" cy="250273"/>
-              </a:xfrm>
-              <a:prstGeom prst="straightConnector1">
-                <a:avLst/>
-              </a:prstGeom>
-              <a:ln w="12700">
-                <a:solidFill>
-                  <a:schemeClr val="tx1"/>
-                </a:solidFill>
-                <a:tailEnd type="triangle"/>
-              </a:ln>
-            </p:spPr>
-            <p:style>
-              <a:lnRef idx="1">
-                <a:schemeClr val="accent1"/>
-              </a:lnRef>
-              <a:fillRef idx="0">
-                <a:schemeClr val="accent1"/>
-              </a:fillRef>
-              <a:effectRef idx="0">
-                <a:schemeClr val="accent1"/>
-              </a:effectRef>
-              <a:fontRef idx="minor">
-                <a:schemeClr val="tx1"/>
-              </a:fontRef>
-            </p:style>
-          </p:cxnSp>
-          <p:cxnSp>
-            <p:nvCxnSpPr>
-              <p:cNvPr id="19" name="Straight Arrow Connector 18">
-                <a:extLst>
-                  <a:ext uri="{FF2B5EF4-FFF2-40B4-BE49-F238E27FC236}">
-                    <a16:creationId xmlns:a16="http://schemas.microsoft.com/office/drawing/2014/main" id="{0BC6307A-9345-6340-A679-C30B2B11F6DA}"/>
-                  </a:ext>
-                </a:extLst>
-              </p:cNvPr>
-              <p:cNvCxnSpPr/>
-              <p:nvPr/>
-            </p:nvCxnSpPr>
-            <p:spPr>
-              <a:xfrm flipV="1">
-                <a:off x="8640296" y="3514641"/>
-                <a:ext cx="0" cy="250273"/>
-              </a:xfrm>
-              <a:prstGeom prst="straightConnector1">
-                <a:avLst/>
-              </a:prstGeom>
-              <a:ln w="12700">
-                <a:solidFill>
-                  <a:schemeClr val="tx1"/>
-                </a:solidFill>
-                <a:tailEnd type="triangle"/>
-              </a:ln>
-            </p:spPr>
-            <p:style>
-              <a:lnRef idx="1">
-                <a:schemeClr val="accent1"/>
-              </a:lnRef>
-              <a:fillRef idx="0">
-                <a:schemeClr val="accent1"/>
-              </a:fillRef>
-              <a:effectRef idx="0">
-                <a:schemeClr val="accent1"/>
-              </a:effectRef>
-              <a:fontRef idx="minor">
-                <a:schemeClr val="tx1"/>
-              </a:fontRef>
-            </p:style>
-          </p:cxnSp>
-          <p:cxnSp>
-            <p:nvCxnSpPr>
-              <p:cNvPr id="20" name="Straight Arrow Connector 19">
-                <a:extLst>
-                  <a:ext uri="{FF2B5EF4-FFF2-40B4-BE49-F238E27FC236}">
-                    <a16:creationId xmlns:a16="http://schemas.microsoft.com/office/drawing/2014/main" id="{1F07E47C-BE41-EC4E-A857-45958E82C647}"/>
-                  </a:ext>
-                </a:extLst>
-              </p:cNvPr>
-              <p:cNvCxnSpPr/>
-              <p:nvPr/>
-            </p:nvCxnSpPr>
-            <p:spPr>
-              <a:xfrm flipV="1">
-                <a:off x="8640296" y="4134246"/>
-                <a:ext cx="0" cy="250273"/>
-              </a:xfrm>
-              <a:prstGeom prst="straightConnector1">
-                <a:avLst/>
-              </a:prstGeom>
-              <a:ln w="12700">
-                <a:solidFill>
-                  <a:schemeClr val="tx1"/>
-                </a:solidFill>
-                <a:tailEnd type="triangle"/>
-              </a:ln>
-            </p:spPr>
-            <p:style>
-              <a:lnRef idx="1">
-                <a:schemeClr val="accent1"/>
-              </a:lnRef>
-              <a:fillRef idx="0">
-                <a:schemeClr val="accent1"/>
-              </a:fillRef>
-              <a:effectRef idx="0">
-                <a:schemeClr val="accent1"/>
-              </a:effectRef>
-              <a:fontRef idx="minor">
-                <a:schemeClr val="tx1"/>
-              </a:fontRef>
-            </p:style>
-          </p:cxnSp>
-          <p:cxnSp>
-            <p:nvCxnSpPr>
-              <p:cNvPr id="21" name="Straight Arrow Connector 20">
-                <a:extLst>
-                  <a:ext uri="{FF2B5EF4-FFF2-40B4-BE49-F238E27FC236}">
-                    <a16:creationId xmlns:a16="http://schemas.microsoft.com/office/drawing/2014/main" id="{075623BA-FD7E-FA49-A8C8-84FFAB19A5BC}"/>
-                  </a:ext>
-                </a:extLst>
-              </p:cNvPr>
-              <p:cNvCxnSpPr/>
-              <p:nvPr/>
-            </p:nvCxnSpPr>
-            <p:spPr>
-              <a:xfrm flipV="1">
-                <a:off x="8640297" y="4753895"/>
-                <a:ext cx="0" cy="250273"/>
-              </a:xfrm>
-              <a:prstGeom prst="straightConnector1">
-                <a:avLst/>
-              </a:prstGeom>
-              <a:ln w="12700">
-                <a:solidFill>
-                  <a:schemeClr val="tx1"/>
-                </a:solidFill>
-                <a:tailEnd type="triangle"/>
-              </a:ln>
-            </p:spPr>
-            <p:style>
-              <a:lnRef idx="1">
-                <a:schemeClr val="accent1"/>
-              </a:lnRef>
-              <a:fillRef idx="0">
-                <a:schemeClr val="accent1"/>
-              </a:fillRef>
-              <a:effectRef idx="0">
-                <a:schemeClr val="accent1"/>
-              </a:effectRef>
-              <a:fontRef idx="minor">
-                <a:schemeClr val="tx1"/>
-              </a:fontRef>
-            </p:style>
-          </p:cxnSp>
-          <p:cxnSp>
-            <p:nvCxnSpPr>
-              <p:cNvPr id="22" name="Straight Arrow Connector 21">
-                <a:extLst>
-                  <a:ext uri="{FF2B5EF4-FFF2-40B4-BE49-F238E27FC236}">
-                    <a16:creationId xmlns:a16="http://schemas.microsoft.com/office/drawing/2014/main" id="{0C26E0E3-0909-AE4C-8827-4159EABF2992}"/>
-                  </a:ext>
-                </a:extLst>
-              </p:cNvPr>
-              <p:cNvCxnSpPr/>
-              <p:nvPr/>
-            </p:nvCxnSpPr>
-            <p:spPr>
-              <a:xfrm flipV="1">
-                <a:off x="8640297" y="5373500"/>
-                <a:ext cx="0" cy="250273"/>
-              </a:xfrm>
-              <a:prstGeom prst="straightConnector1">
-                <a:avLst/>
-              </a:prstGeom>
-              <a:ln w="12700">
-                <a:solidFill>
-                  <a:schemeClr val="tx1"/>
-                </a:solidFill>
-                <a:tailEnd type="triangle"/>
-              </a:ln>
-            </p:spPr>
-            <p:style>
-              <a:lnRef idx="1">
-                <a:schemeClr val="accent1"/>
-              </a:lnRef>
-              <a:fillRef idx="0">
-                <a:schemeClr val="accent1"/>
-              </a:fillRef>
-              <a:effectRef idx="0">
-                <a:schemeClr val="accent1"/>
-              </a:effectRef>
-              <a:fontRef idx="minor">
-                <a:schemeClr val="tx1"/>
-              </a:fontRef>
-            </p:style>
-          </p:cxnSp>
-          <p:sp>
-            <p:nvSpPr>
-              <p:cNvPr id="40" name="TextBox 39">
-                <a:extLst>
-                  <a:ext uri="{FF2B5EF4-FFF2-40B4-BE49-F238E27FC236}">
-                    <a16:creationId xmlns:a16="http://schemas.microsoft.com/office/drawing/2014/main" id="{C1EED93F-72C8-B843-83CE-BD80C2497B37}"/>
-                  </a:ext>
-                </a:extLst>
-              </p:cNvPr>
-              <p:cNvSpPr txBox="1"/>
-              <p:nvPr/>
-            </p:nvSpPr>
-            <p:spPr>
-              <a:xfrm>
-                <a:off x="8647037" y="1631139"/>
-                <a:ext cx="1935243" cy="276999"/>
-              </a:xfrm>
-              <a:prstGeom prst="rect">
-                <a:avLst/>
-              </a:prstGeom>
-              <a:noFill/>
-            </p:spPr>
-            <p:txBody>
-              <a:bodyPr wrap="square" rtlCol="0">
-                <a:spAutoFit/>
-              </a:bodyPr>
-              <a:lstStyle/>
-              <a:p>
-                <a:r>
-                  <a:rPr lang="en-US" sz="1200" dirty="0"/>
-                  <a:t>Has a single set of elements</a:t>
-                </a:r>
-              </a:p>
-            </p:txBody>
-          </p:sp>
-        </p:grpSp>
-        <p:grpSp>
-          <p:nvGrpSpPr>
-            <p:cNvPr id="59" name="Group 58">
-              <a:extLst>
-                <a:ext uri="{FF2B5EF4-FFF2-40B4-BE49-F238E27FC236}">
-                  <a16:creationId xmlns:a16="http://schemas.microsoft.com/office/drawing/2014/main" id="{70B03B93-E81C-9049-8AFE-A2598E75C4B6}"/>
-                </a:ext>
-              </a:extLst>
-            </p:cNvPr>
-            <p:cNvGrpSpPr/>
-            <p:nvPr/>
-          </p:nvGrpSpPr>
-          <p:grpSpPr>
-            <a:xfrm>
-              <a:off x="4266638" y="1631139"/>
-              <a:ext cx="3190877" cy="1884238"/>
-              <a:chOff x="4266638" y="1631139"/>
-              <a:chExt cx="3190877" cy="1884238"/>
-            </a:xfrm>
-          </p:grpSpPr>
-          <p:sp>
-            <p:nvSpPr>
-              <p:cNvPr id="3" name="TextBox 2">
-                <a:extLst>
-                  <a:ext uri="{FF2B5EF4-FFF2-40B4-BE49-F238E27FC236}">
-                    <a16:creationId xmlns:a16="http://schemas.microsoft.com/office/drawing/2014/main" id="{F1AD1DAA-B8CC-4741-B579-50D339A84149}"/>
-                  </a:ext>
-                </a:extLst>
-              </p:cNvPr>
-              <p:cNvSpPr txBox="1"/>
-              <p:nvPr/>
-            </p:nvSpPr>
-            <p:spPr>
-              <a:xfrm>
-                <a:off x="4542303" y="3146045"/>
-                <a:ext cx="1488142" cy="369332"/>
-              </a:xfrm>
-              <a:prstGeom prst="rect">
-                <a:avLst/>
-              </a:prstGeom>
-              <a:noFill/>
-              <a:ln>
-                <a:solidFill>
-                  <a:schemeClr val="tx1"/>
-                </a:solidFill>
-              </a:ln>
-            </p:spPr>
-            <p:txBody>
-              <a:bodyPr wrap="square" rtlCol="0">
-                <a:spAutoFit/>
-              </a:bodyPr>
-              <a:lstStyle/>
-              <a:p>
-                <a:pPr algn="ctr"/>
-                <a:r>
-                  <a:rPr lang="en-US" dirty="0"/>
-                  <a:t>VectorSpace</a:t>
-                </a:r>
-              </a:p>
-            </p:txBody>
-          </p:sp>
-          <p:sp>
-            <p:nvSpPr>
-              <p:cNvPr id="4" name="TextBox 3">
-                <a:extLst>
-                  <a:ext uri="{FF2B5EF4-FFF2-40B4-BE49-F238E27FC236}">
-                    <a16:creationId xmlns:a16="http://schemas.microsoft.com/office/drawing/2014/main" id="{AF2ED9AD-ACB8-2343-B41E-FCA9A39C59CD}"/>
-                  </a:ext>
-                </a:extLst>
-              </p:cNvPr>
-              <p:cNvSpPr txBox="1"/>
-              <p:nvPr/>
-            </p:nvSpPr>
-            <p:spPr>
-              <a:xfrm>
-                <a:off x="4793315" y="2527912"/>
-                <a:ext cx="986119" cy="369332"/>
-              </a:xfrm>
-              <a:prstGeom prst="rect">
-                <a:avLst/>
-              </a:prstGeom>
-              <a:noFill/>
-              <a:ln>
-                <a:solidFill>
-                  <a:schemeClr val="tx1"/>
-                </a:solidFill>
-              </a:ln>
-            </p:spPr>
-            <p:txBody>
-              <a:bodyPr wrap="square" rtlCol="0">
-                <a:spAutoFit/>
-              </a:bodyPr>
-              <a:lstStyle/>
-              <a:p>
-                <a:pPr algn="ctr"/>
-                <a:r>
-                  <a:rPr lang="en-US" dirty="0"/>
-                  <a:t>Module</a:t>
-                </a:r>
-              </a:p>
-            </p:txBody>
-          </p:sp>
-          <p:sp>
-            <p:nvSpPr>
-              <p:cNvPr id="12" name="TextBox 11">
-                <a:extLst>
-                  <a:ext uri="{FF2B5EF4-FFF2-40B4-BE49-F238E27FC236}">
-                    <a16:creationId xmlns:a16="http://schemas.microsoft.com/office/drawing/2014/main" id="{A6729132-0692-EC44-8603-F45E2513B144}"/>
-                  </a:ext>
-                </a:extLst>
-              </p:cNvPr>
-              <p:cNvSpPr txBox="1"/>
-              <p:nvPr/>
-            </p:nvSpPr>
-            <p:spPr>
-              <a:xfrm>
-                <a:off x="4266638" y="1908307"/>
-                <a:ext cx="2039473" cy="369332"/>
-              </a:xfrm>
-              <a:prstGeom prst="rect">
-                <a:avLst/>
-              </a:prstGeom>
-              <a:noFill/>
-              <a:ln>
-                <a:solidFill>
-                  <a:schemeClr val="tx1"/>
-                </a:solidFill>
-                <a:prstDash val="dash"/>
-              </a:ln>
-            </p:spPr>
-            <p:txBody>
-              <a:bodyPr wrap="square" rtlCol="0">
-                <a:spAutoFit/>
-              </a:bodyPr>
-              <a:lstStyle/>
-              <a:p>
-                <a:pPr algn="ctr"/>
-                <a:r>
-                  <a:rPr lang="en-US" dirty="0">
-                    <a:solidFill>
-                      <a:schemeClr val="bg2">
-                        <a:lumMod val="50000"/>
-                      </a:schemeClr>
-                    </a:solidFill>
-                  </a:rPr>
-                  <a:t>CompositeAlgebra</a:t>
-                </a:r>
-              </a:p>
-            </p:txBody>
-          </p:sp>
-          <p:cxnSp>
-            <p:nvCxnSpPr>
-              <p:cNvPr id="15" name="Straight Arrow Connector 14">
-                <a:extLst>
-                  <a:ext uri="{FF2B5EF4-FFF2-40B4-BE49-F238E27FC236}">
-                    <a16:creationId xmlns:a16="http://schemas.microsoft.com/office/drawing/2014/main" id="{DB8A980A-C926-5241-ABC6-5306A7D5948F}"/>
-                  </a:ext>
-                </a:extLst>
-              </p:cNvPr>
-              <p:cNvCxnSpPr>
-                <a:stCxn id="4" idx="0"/>
-                <a:endCxn id="12" idx="2"/>
-              </p:cNvCxnSpPr>
-              <p:nvPr/>
-            </p:nvCxnSpPr>
-            <p:spPr>
-              <a:xfrm flipV="1">
-                <a:off x="5286375" y="2277639"/>
-                <a:ext cx="0" cy="250273"/>
-              </a:xfrm>
-              <a:prstGeom prst="straightConnector1">
-                <a:avLst/>
-              </a:prstGeom>
-              <a:ln w="12700">
-                <a:solidFill>
-                  <a:schemeClr val="tx1"/>
-                </a:solidFill>
-                <a:tailEnd type="triangle"/>
-              </a:ln>
-            </p:spPr>
-            <p:style>
-              <a:lnRef idx="1">
-                <a:schemeClr val="accent1"/>
-              </a:lnRef>
-              <a:fillRef idx="0">
-                <a:schemeClr val="accent1"/>
-              </a:fillRef>
-              <a:effectRef idx="0">
-                <a:schemeClr val="accent1"/>
-              </a:effectRef>
-              <a:fontRef idx="minor">
-                <a:schemeClr val="tx1"/>
-              </a:fontRef>
-            </p:style>
-          </p:cxnSp>
-          <p:cxnSp>
-            <p:nvCxnSpPr>
-              <p:cNvPr id="16" name="Straight Arrow Connector 15">
-                <a:extLst>
-                  <a:ext uri="{FF2B5EF4-FFF2-40B4-BE49-F238E27FC236}">
-                    <a16:creationId xmlns:a16="http://schemas.microsoft.com/office/drawing/2014/main" id="{EBC6DA3B-9B3F-3A4A-9910-25CE75BCDD9B}"/>
-                  </a:ext>
-                </a:extLst>
-              </p:cNvPr>
-              <p:cNvCxnSpPr/>
-              <p:nvPr/>
-            </p:nvCxnSpPr>
-            <p:spPr>
-              <a:xfrm flipV="1">
-                <a:off x="5286375" y="2895772"/>
-                <a:ext cx="0" cy="250273"/>
-              </a:xfrm>
-              <a:prstGeom prst="straightConnector1">
-                <a:avLst/>
-              </a:prstGeom>
-              <a:ln w="12700">
-                <a:solidFill>
-                  <a:schemeClr val="tx1"/>
-                </a:solidFill>
-                <a:tailEnd type="triangle"/>
-              </a:ln>
-            </p:spPr>
-            <p:style>
-              <a:lnRef idx="1">
-                <a:schemeClr val="accent1"/>
-              </a:lnRef>
-              <a:fillRef idx="0">
-                <a:schemeClr val="accent1"/>
-              </a:fillRef>
-              <a:effectRef idx="0">
-                <a:schemeClr val="accent1"/>
-              </a:effectRef>
-              <a:fontRef idx="minor">
-                <a:schemeClr val="tx1"/>
-              </a:fontRef>
-            </p:style>
-          </p:cxnSp>
-          <p:sp>
-            <p:nvSpPr>
-              <p:cNvPr id="43" name="TextBox 42">
-                <a:extLst>
-                  <a:ext uri="{FF2B5EF4-FFF2-40B4-BE49-F238E27FC236}">
-                    <a16:creationId xmlns:a16="http://schemas.microsoft.com/office/drawing/2014/main" id="{C0F0D1B3-E284-5842-BC6B-3AFC9DE2462C}"/>
-                  </a:ext>
-                </a:extLst>
-              </p:cNvPr>
-              <p:cNvSpPr txBox="1"/>
-              <p:nvPr/>
-            </p:nvSpPr>
-            <p:spPr>
-              <a:xfrm>
-                <a:off x="5286374" y="1631139"/>
-                <a:ext cx="2171141" cy="276999"/>
-              </a:xfrm>
-              <a:prstGeom prst="rect">
-                <a:avLst/>
-              </a:prstGeom>
-              <a:noFill/>
-            </p:spPr>
-            <p:txBody>
-              <a:bodyPr wrap="square" rtlCol="0">
-                <a:spAutoFit/>
-              </a:bodyPr>
-              <a:lstStyle/>
-              <a:p>
-                <a:r>
-                  <a:rPr lang="en-US" sz="1200" dirty="0"/>
-                  <a:t>Has a multiple sets of elements</a:t>
-                </a:r>
-              </a:p>
-            </p:txBody>
-          </p:sp>
-        </p:grpSp>
-        <p:grpSp>
-          <p:nvGrpSpPr>
-            <p:cNvPr id="58" name="Group 57">
-              <a:extLst>
-                <a:ext uri="{FF2B5EF4-FFF2-40B4-BE49-F238E27FC236}">
-                  <a16:creationId xmlns:a16="http://schemas.microsoft.com/office/drawing/2014/main" id="{6E86D834-382C-5147-B426-183608BCE5FD}"/>
-                </a:ext>
-              </a:extLst>
-            </p:cNvPr>
-            <p:cNvGrpSpPr/>
-            <p:nvPr/>
-          </p:nvGrpSpPr>
-          <p:grpSpPr>
-            <a:xfrm>
-              <a:off x="5130332" y="4292350"/>
+              <a:off x="5514940" y="4340384"/>
               <a:ext cx="1612247" cy="1219649"/>
-              <a:chOff x="5130332" y="4292350"/>
+              <a:chOff x="6037454" y="4392246"/>
               <a:chExt cx="1612247" cy="1219649"/>
             </a:xfrm>
           </p:grpSpPr>
@@ -6138,7 +6030,7 @@
             </p:nvSpPr>
             <p:spPr>
               <a:xfrm>
-                <a:off x="5188878" y="4636359"/>
+                <a:off x="6096000" y="4736255"/>
                 <a:ext cx="1553701" cy="276999"/>
               </a:xfrm>
               <a:prstGeom prst="rect">
@@ -6186,7 +6078,7 @@
             </p:nvSpPr>
             <p:spPr>
               <a:xfrm>
-                <a:off x="5188878" y="5235000"/>
+                <a:off x="6096000" y="5334896"/>
                 <a:ext cx="1553691" cy="276999"/>
               </a:xfrm>
               <a:prstGeom prst="rect">
@@ -6231,7 +6123,7 @@
             </p:nvCxnSpPr>
             <p:spPr>
               <a:xfrm flipV="1">
-                <a:off x="5965724" y="4913358"/>
+                <a:off x="6872846" y="5013254"/>
                 <a:ext cx="5" cy="321642"/>
               </a:xfrm>
               <a:prstGeom prst="straightConnector1">
@@ -6273,7 +6165,7 @@
             </p:nvSpPr>
             <p:spPr>
               <a:xfrm>
-                <a:off x="5965723" y="4935679"/>
+                <a:off x="6872845" y="5035575"/>
                 <a:ext cx="432274" cy="276999"/>
               </a:xfrm>
               <a:prstGeom prst="rect">
@@ -6308,7 +6200,7 @@
             </p:nvSpPr>
             <p:spPr>
               <a:xfrm>
-                <a:off x="5130332" y="4292350"/>
+                <a:off x="6037454" y="4392246"/>
                 <a:ext cx="835392" cy="276999"/>
               </a:xfrm>
               <a:prstGeom prst="rect">

</xml_diff>

<commit_message>
forgot to save ppt file w/ figures
</commit_message>
<xml_diff>
--- a/misc/group_representation.pptx
+++ b/misc/group_representation.pptx
@@ -260,7 +260,7 @@
           <a:p>
             <a:fld id="{084E4D11-7DD8-6241-BDF9-F23E33E31776}" type="datetimeFigureOut">
               <a:rPr lang="en-US" smtClean="0"/>
-              <a:t>9/13/21</a:t>
+              <a:t>9/18/21</a:t>
             </a:fld>
             <a:endParaRPr lang="en-US"/>
           </a:p>
@@ -458,7 +458,7 @@
           <a:p>
             <a:fld id="{084E4D11-7DD8-6241-BDF9-F23E33E31776}" type="datetimeFigureOut">
               <a:rPr lang="en-US" smtClean="0"/>
-              <a:t>9/13/21</a:t>
+              <a:t>9/18/21</a:t>
             </a:fld>
             <a:endParaRPr lang="en-US"/>
           </a:p>
@@ -666,7 +666,7 @@
           <a:p>
             <a:fld id="{084E4D11-7DD8-6241-BDF9-F23E33E31776}" type="datetimeFigureOut">
               <a:rPr lang="en-US" smtClean="0"/>
-              <a:t>9/13/21</a:t>
+              <a:t>9/18/21</a:t>
             </a:fld>
             <a:endParaRPr lang="en-US"/>
           </a:p>
@@ -864,7 +864,7 @@
           <a:p>
             <a:fld id="{084E4D11-7DD8-6241-BDF9-F23E33E31776}" type="datetimeFigureOut">
               <a:rPr lang="en-US" smtClean="0"/>
-              <a:t>9/13/21</a:t>
+              <a:t>9/18/21</a:t>
             </a:fld>
             <a:endParaRPr lang="en-US"/>
           </a:p>
@@ -1139,7 +1139,7 @@
           <a:p>
             <a:fld id="{084E4D11-7DD8-6241-BDF9-F23E33E31776}" type="datetimeFigureOut">
               <a:rPr lang="en-US" smtClean="0"/>
-              <a:t>9/13/21</a:t>
+              <a:t>9/18/21</a:t>
             </a:fld>
             <a:endParaRPr lang="en-US"/>
           </a:p>
@@ -1404,7 +1404,7 @@
           <a:p>
             <a:fld id="{084E4D11-7DD8-6241-BDF9-F23E33E31776}" type="datetimeFigureOut">
               <a:rPr lang="en-US" smtClean="0"/>
-              <a:t>9/13/21</a:t>
+              <a:t>9/18/21</a:t>
             </a:fld>
             <a:endParaRPr lang="en-US"/>
           </a:p>
@@ -1816,7 +1816,7 @@
           <a:p>
             <a:fld id="{084E4D11-7DD8-6241-BDF9-F23E33E31776}" type="datetimeFigureOut">
               <a:rPr lang="en-US" smtClean="0"/>
-              <a:t>9/13/21</a:t>
+              <a:t>9/18/21</a:t>
             </a:fld>
             <a:endParaRPr lang="en-US"/>
           </a:p>
@@ -1957,7 +1957,7 @@
           <a:p>
             <a:fld id="{084E4D11-7DD8-6241-BDF9-F23E33E31776}" type="datetimeFigureOut">
               <a:rPr lang="en-US" smtClean="0"/>
-              <a:t>9/13/21</a:t>
+              <a:t>9/18/21</a:t>
             </a:fld>
             <a:endParaRPr lang="en-US"/>
           </a:p>
@@ -2070,7 +2070,7 @@
           <a:p>
             <a:fld id="{084E4D11-7DD8-6241-BDF9-F23E33E31776}" type="datetimeFigureOut">
               <a:rPr lang="en-US" smtClean="0"/>
-              <a:t>9/13/21</a:t>
+              <a:t>9/18/21</a:t>
             </a:fld>
             <a:endParaRPr lang="en-US"/>
           </a:p>
@@ -2381,7 +2381,7 @@
           <a:p>
             <a:fld id="{084E4D11-7DD8-6241-BDF9-F23E33E31776}" type="datetimeFigureOut">
               <a:rPr lang="en-US" smtClean="0"/>
-              <a:t>9/13/21</a:t>
+              <a:t>9/18/21</a:t>
             </a:fld>
             <a:endParaRPr lang="en-US"/>
           </a:p>
@@ -2669,7 +2669,7 @@
           <a:p>
             <a:fld id="{084E4D11-7DD8-6241-BDF9-F23E33E31776}" type="datetimeFigureOut">
               <a:rPr lang="en-US" smtClean="0"/>
-              <a:t>9/13/21</a:t>
+              <a:t>9/18/21</a:t>
             </a:fld>
             <a:endParaRPr lang="en-US"/>
           </a:p>
@@ -2910,7 +2910,7 @@
           <a:p>
             <a:fld id="{084E4D11-7DD8-6241-BDF9-F23E33E31776}" type="datetimeFigureOut">
               <a:rPr lang="en-US" smtClean="0"/>
-              <a:t>9/13/21</a:t>
+              <a:t>9/18/21</a:t>
             </a:fld>
             <a:endParaRPr lang="en-US"/>
           </a:p>
@@ -5512,16 +5512,15 @@
             <a:p>
               <a:pPr algn="ctr"/>
               <a:r>
-                <a:rPr lang="en-US" dirty="0"/>
+                <a:rPr lang="en-US" dirty="0">
+                  <a:solidFill>
+                    <a:schemeClr val="bg2">
+                      <a:lumMod val="50000"/>
+                    </a:schemeClr>
+                  </a:solidFill>
+                </a:rPr>
                 <a:t>SingleElementSetAlgebra</a:t>
               </a:r>
-              <a:endParaRPr lang="en-US" dirty="0">
-                <a:solidFill>
-                  <a:schemeClr val="bg2">
-                    <a:lumMod val="50000"/>
-                  </a:schemeClr>
-                </a:solidFill>
-              </a:endParaRPr>
             </a:p>
           </p:txBody>
         </p:sp>
@@ -5895,16 +5894,15 @@
             <a:p>
               <a:pPr algn="ctr"/>
               <a:r>
-                <a:rPr lang="en-US" dirty="0"/>
+                <a:rPr lang="en-US" dirty="0">
+                  <a:solidFill>
+                    <a:schemeClr val="bg2">
+                      <a:lumMod val="50000"/>
+                    </a:schemeClr>
+                  </a:solidFill>
+                </a:rPr>
                 <a:t>MultipleElementSetAlgebra</a:t>
               </a:r>
-              <a:endParaRPr lang="en-US" dirty="0">
-                <a:solidFill>
-                  <a:schemeClr val="bg2">
-                    <a:lumMod val="50000"/>
-                  </a:schemeClr>
-                </a:solidFill>
-              </a:endParaRPr>
             </a:p>
           </p:txBody>
         </p:sp>

</xml_diff>

<commit_message>
New Cayley Table Diagram
</commit_message>
<xml_diff>
--- a/misc/group_representation.pptx
+++ b/misc/group_representation.pptx
@@ -8,6 +8,7 @@
     <p:sldId id="256" r:id="rId2"/>
     <p:sldId id="258" r:id="rId3"/>
     <p:sldId id="259" r:id="rId4"/>
+    <p:sldId id="260" r:id="rId5"/>
   </p:sldIdLst>
   <p:sldSz cx="12192000" cy="6858000"/>
   <p:notesSz cx="6858000" cy="9144000"/>
@@ -261,7 +262,7 @@
           <a:p>
             <a:fld id="{084E4D11-7DD8-6241-BDF9-F23E33E31776}" type="datetimeFigureOut">
               <a:rPr lang="en-US" smtClean="0"/>
-              <a:t>1/10/22</a:t>
+              <a:t>1/21/22</a:t>
             </a:fld>
             <a:endParaRPr lang="en-US"/>
           </a:p>
@@ -459,7 +460,7 @@
           <a:p>
             <a:fld id="{084E4D11-7DD8-6241-BDF9-F23E33E31776}" type="datetimeFigureOut">
               <a:rPr lang="en-US" smtClean="0"/>
-              <a:t>1/10/22</a:t>
+              <a:t>1/21/22</a:t>
             </a:fld>
             <a:endParaRPr lang="en-US"/>
           </a:p>
@@ -667,7 +668,7 @@
           <a:p>
             <a:fld id="{084E4D11-7DD8-6241-BDF9-F23E33E31776}" type="datetimeFigureOut">
               <a:rPr lang="en-US" smtClean="0"/>
-              <a:t>1/10/22</a:t>
+              <a:t>1/21/22</a:t>
             </a:fld>
             <a:endParaRPr lang="en-US"/>
           </a:p>
@@ -865,7 +866,7 @@
           <a:p>
             <a:fld id="{084E4D11-7DD8-6241-BDF9-F23E33E31776}" type="datetimeFigureOut">
               <a:rPr lang="en-US" smtClean="0"/>
-              <a:t>1/10/22</a:t>
+              <a:t>1/21/22</a:t>
             </a:fld>
             <a:endParaRPr lang="en-US"/>
           </a:p>
@@ -1140,7 +1141,7 @@
           <a:p>
             <a:fld id="{084E4D11-7DD8-6241-BDF9-F23E33E31776}" type="datetimeFigureOut">
               <a:rPr lang="en-US" smtClean="0"/>
-              <a:t>1/10/22</a:t>
+              <a:t>1/21/22</a:t>
             </a:fld>
             <a:endParaRPr lang="en-US"/>
           </a:p>
@@ -1405,7 +1406,7 @@
           <a:p>
             <a:fld id="{084E4D11-7DD8-6241-BDF9-F23E33E31776}" type="datetimeFigureOut">
               <a:rPr lang="en-US" smtClean="0"/>
-              <a:t>1/10/22</a:t>
+              <a:t>1/21/22</a:t>
             </a:fld>
             <a:endParaRPr lang="en-US"/>
           </a:p>
@@ -1817,7 +1818,7 @@
           <a:p>
             <a:fld id="{084E4D11-7DD8-6241-BDF9-F23E33E31776}" type="datetimeFigureOut">
               <a:rPr lang="en-US" smtClean="0"/>
-              <a:t>1/10/22</a:t>
+              <a:t>1/21/22</a:t>
             </a:fld>
             <a:endParaRPr lang="en-US"/>
           </a:p>
@@ -1958,7 +1959,7 @@
           <a:p>
             <a:fld id="{084E4D11-7DD8-6241-BDF9-F23E33E31776}" type="datetimeFigureOut">
               <a:rPr lang="en-US" smtClean="0"/>
-              <a:t>1/10/22</a:t>
+              <a:t>1/21/22</a:t>
             </a:fld>
             <a:endParaRPr lang="en-US"/>
           </a:p>
@@ -2071,7 +2072,7 @@
           <a:p>
             <a:fld id="{084E4D11-7DD8-6241-BDF9-F23E33E31776}" type="datetimeFigureOut">
               <a:rPr lang="en-US" smtClean="0"/>
-              <a:t>1/10/22</a:t>
+              <a:t>1/21/22</a:t>
             </a:fld>
             <a:endParaRPr lang="en-US"/>
           </a:p>
@@ -2382,7 +2383,7 @@
           <a:p>
             <a:fld id="{084E4D11-7DD8-6241-BDF9-F23E33E31776}" type="datetimeFigureOut">
               <a:rPr lang="en-US" smtClean="0"/>
-              <a:t>1/10/22</a:t>
+              <a:t>1/21/22</a:t>
             </a:fld>
             <a:endParaRPr lang="en-US"/>
           </a:p>
@@ -2670,7 +2671,7 @@
           <a:p>
             <a:fld id="{084E4D11-7DD8-6241-BDF9-F23E33E31776}" type="datetimeFigureOut">
               <a:rPr lang="en-US" smtClean="0"/>
-              <a:t>1/10/22</a:t>
+              <a:t>1/21/22</a:t>
             </a:fld>
             <a:endParaRPr lang="en-US"/>
           </a:p>
@@ -2911,7 +2912,7 @@
           <a:p>
             <a:fld id="{084E4D11-7DD8-6241-BDF9-F23E33E31776}" type="datetimeFigureOut">
               <a:rPr lang="en-US" smtClean="0"/>
-              <a:t>1/10/22</a:t>
+              <a:t>1/21/22</a:t>
             </a:fld>
             <a:endParaRPr lang="en-US"/>
           </a:p>
@@ -6810,6 +6811,832 @@
 </p:sld>
 </file>
 
+<file path=ppt/slides/slide4.xml><?xml version="1.0" encoding="utf-8"?>
+<p:sld xmlns:a="http://schemas.openxmlformats.org/drawingml/2006/main" xmlns:r="http://schemas.openxmlformats.org/officeDocument/2006/relationships" xmlns:p="http://schemas.openxmlformats.org/presentationml/2006/main">
+  <p:cSld>
+    <p:spTree>
+      <p:nvGrpSpPr>
+        <p:cNvPr id="1" name=""/>
+        <p:cNvGrpSpPr/>
+        <p:nvPr/>
+      </p:nvGrpSpPr>
+      <p:grpSpPr>
+        <a:xfrm>
+          <a:off x="0" y="0"/>
+          <a:ext cx="0" cy="0"/>
+          <a:chOff x="0" y="0"/>
+          <a:chExt cx="0" cy="0"/>
+        </a:xfrm>
+      </p:grpSpPr>
+      <p:sp>
+        <p:nvSpPr>
+          <p:cNvPr id="87" name="TextBox 86">
+            <a:extLst>
+              <a:ext uri="{FF2B5EF4-FFF2-40B4-BE49-F238E27FC236}">
+                <a16:creationId xmlns:a16="http://schemas.microsoft.com/office/drawing/2014/main" id="{310DE4B4-AEB7-8D41-A940-6A5989B95499}"/>
+              </a:ext>
+            </a:extLst>
+          </p:cNvPr>
+          <p:cNvSpPr txBox="1"/>
+          <p:nvPr/>
+        </p:nvSpPr>
+        <p:spPr>
+          <a:xfrm>
+            <a:off x="3901033" y="509504"/>
+            <a:ext cx="4880247" cy="584775"/>
+          </a:xfrm>
+          <a:prstGeom prst="rect">
+            <a:avLst/>
+          </a:prstGeom>
+          <a:noFill/>
+        </p:spPr>
+        <p:txBody>
+          <a:bodyPr wrap="none" rtlCol="0">
+            <a:spAutoFit/>
+          </a:bodyPr>
+          <a:lstStyle/>
+          <a:p>
+            <a:r>
+              <a:rPr lang="en-US" sz="3200" dirty="0"/>
+              <a:t>Cayley Table for RPS Magma</a:t>
+            </a:r>
+          </a:p>
+        </p:txBody>
+      </p:sp>
+      <p:grpSp>
+        <p:nvGrpSpPr>
+          <p:cNvPr id="15" name="Group 14">
+            <a:extLst>
+              <a:ext uri="{FF2B5EF4-FFF2-40B4-BE49-F238E27FC236}">
+                <a16:creationId xmlns:a16="http://schemas.microsoft.com/office/drawing/2014/main" id="{B95C43DB-A278-DB43-A14A-ED0007BC420F}"/>
+              </a:ext>
+            </a:extLst>
+          </p:cNvPr>
+          <p:cNvGrpSpPr/>
+          <p:nvPr/>
+        </p:nvGrpSpPr>
+        <p:grpSpPr>
+          <a:xfrm>
+            <a:off x="2348754" y="2029140"/>
+            <a:ext cx="7787530" cy="3143472"/>
+            <a:chOff x="2348754" y="2029140"/>
+            <a:chExt cx="7787530" cy="3143472"/>
+          </a:xfrm>
+        </p:grpSpPr>
+        <p:sp>
+          <p:nvSpPr>
+            <p:cNvPr id="81" name="Rectangle 80">
+              <a:extLst>
+                <a:ext uri="{FF2B5EF4-FFF2-40B4-BE49-F238E27FC236}">
+                  <a16:creationId xmlns:a16="http://schemas.microsoft.com/office/drawing/2014/main" id="{AFDC084F-D520-1A46-9947-91EDDA3392A5}"/>
+                </a:ext>
+              </a:extLst>
+            </p:cNvPr>
+            <p:cNvSpPr/>
+            <p:nvPr/>
+          </p:nvSpPr>
+          <p:spPr>
+            <a:xfrm>
+              <a:off x="3203209" y="2833726"/>
+              <a:ext cx="1456392" cy="1493474"/>
+            </a:xfrm>
+            <a:prstGeom prst="rect">
+              <a:avLst/>
+            </a:prstGeom>
+            <a:noFill/>
+          </p:spPr>
+          <p:style>
+            <a:lnRef idx="2">
+              <a:schemeClr val="accent1">
+                <a:shade val="50000"/>
+              </a:schemeClr>
+            </a:lnRef>
+            <a:fillRef idx="1">
+              <a:schemeClr val="accent1"/>
+            </a:fillRef>
+            <a:effectRef idx="0">
+              <a:schemeClr val="accent1"/>
+            </a:effectRef>
+            <a:fontRef idx="minor">
+              <a:schemeClr val="lt1"/>
+            </a:fontRef>
+          </p:style>
+          <p:txBody>
+            <a:bodyPr rtlCol="0" anchor="ctr"/>
+            <a:lstStyle/>
+            <a:p>
+              <a:pPr algn="ctr"/>
+              <a:endParaRPr lang="en-US"/>
+            </a:p>
+          </p:txBody>
+        </p:sp>
+        <p:sp>
+          <p:nvSpPr>
+            <p:cNvPr id="66" name="TextBox 65">
+              <a:extLst>
+                <a:ext uri="{FF2B5EF4-FFF2-40B4-BE49-F238E27FC236}">
+                  <a16:creationId xmlns:a16="http://schemas.microsoft.com/office/drawing/2014/main" id="{7D13BDF1-7332-FF42-B19C-909894004C76}"/>
+                </a:ext>
+              </a:extLst>
+            </p:cNvPr>
+            <p:cNvSpPr txBox="1"/>
+            <p:nvPr/>
+          </p:nvSpPr>
+          <p:spPr>
+            <a:xfrm>
+              <a:off x="3759997" y="3295713"/>
+              <a:ext cx="889987" cy="923330"/>
+            </a:xfrm>
+            <a:prstGeom prst="rect">
+              <a:avLst/>
+            </a:prstGeom>
+            <a:noFill/>
+          </p:spPr>
+          <p:txBody>
+            <a:bodyPr wrap="none" rtlCol="0">
+              <a:spAutoFit/>
+            </a:bodyPr>
+            <a:lstStyle/>
+            <a:p>
+              <a:r>
+                <a:rPr lang="en-US" dirty="0"/>
+                <a:t>r   p   r  </a:t>
+              </a:r>
+            </a:p>
+            <a:p>
+              <a:r>
+                <a:rPr lang="en-US" dirty="0"/>
+                <a:t>p  p   s  </a:t>
+              </a:r>
+            </a:p>
+            <a:p>
+              <a:r>
+                <a:rPr lang="en-US" dirty="0"/>
+                <a:t>r   s   s  </a:t>
+              </a:r>
+            </a:p>
+          </p:txBody>
+        </p:sp>
+        <p:sp>
+          <p:nvSpPr>
+            <p:cNvPr id="67" name="TextBox 66">
+              <a:extLst>
+                <a:ext uri="{FF2B5EF4-FFF2-40B4-BE49-F238E27FC236}">
+                  <a16:creationId xmlns:a16="http://schemas.microsoft.com/office/drawing/2014/main" id="{E2DE8CE4-9792-1641-97A8-2E12EECAEE81}"/>
+                </a:ext>
+              </a:extLst>
+            </p:cNvPr>
+            <p:cNvSpPr txBox="1"/>
+            <p:nvPr/>
+          </p:nvSpPr>
+          <p:spPr>
+            <a:xfrm>
+              <a:off x="3759996" y="2926381"/>
+              <a:ext cx="899605" cy="369332"/>
+            </a:xfrm>
+            <a:prstGeom prst="rect">
+              <a:avLst/>
+            </a:prstGeom>
+            <a:noFill/>
+          </p:spPr>
+          <p:txBody>
+            <a:bodyPr wrap="none" rtlCol="0">
+              <a:spAutoFit/>
+            </a:bodyPr>
+            <a:lstStyle/>
+            <a:p>
+              <a:r>
+                <a:rPr lang="en-US" dirty="0"/>
+                <a:t>r   p   s  </a:t>
+              </a:r>
+            </a:p>
+          </p:txBody>
+        </p:sp>
+        <p:sp>
+          <p:nvSpPr>
+            <p:cNvPr id="68" name="TextBox 67">
+              <a:extLst>
+                <a:ext uri="{FF2B5EF4-FFF2-40B4-BE49-F238E27FC236}">
+                  <a16:creationId xmlns:a16="http://schemas.microsoft.com/office/drawing/2014/main" id="{FCFF9E00-12BB-1947-80E2-5B628FF4CDAE}"/>
+                </a:ext>
+              </a:extLst>
+            </p:cNvPr>
+            <p:cNvSpPr txBox="1"/>
+            <p:nvPr/>
+          </p:nvSpPr>
+          <p:spPr>
+            <a:xfrm>
+              <a:off x="3371722" y="3295713"/>
+              <a:ext cx="306494" cy="923330"/>
+            </a:xfrm>
+            <a:prstGeom prst="rect">
+              <a:avLst/>
+            </a:prstGeom>
+            <a:noFill/>
+          </p:spPr>
+          <p:txBody>
+            <a:bodyPr wrap="none" rtlCol="0">
+              <a:spAutoFit/>
+            </a:bodyPr>
+            <a:lstStyle/>
+            <a:p>
+              <a:r>
+                <a:rPr lang="en-US" dirty="0"/>
+                <a:t>r</a:t>
+              </a:r>
+            </a:p>
+            <a:p>
+              <a:r>
+                <a:rPr lang="en-US" dirty="0"/>
+                <a:t>p</a:t>
+              </a:r>
+            </a:p>
+            <a:p>
+              <a:r>
+                <a:rPr lang="en-US" dirty="0"/>
+                <a:t>s</a:t>
+              </a:r>
+            </a:p>
+          </p:txBody>
+        </p:sp>
+        <p:cxnSp>
+          <p:nvCxnSpPr>
+            <p:cNvPr id="70" name="Straight Connector 69">
+              <a:extLst>
+                <a:ext uri="{FF2B5EF4-FFF2-40B4-BE49-F238E27FC236}">
+                  <a16:creationId xmlns:a16="http://schemas.microsoft.com/office/drawing/2014/main" id="{5ABCD65F-BB24-8B4D-9049-2012151C7E78}"/>
+                </a:ext>
+              </a:extLst>
+            </p:cNvPr>
+            <p:cNvCxnSpPr>
+              <a:cxnSpLocks/>
+            </p:cNvCxnSpPr>
+            <p:nvPr/>
+          </p:nvCxnSpPr>
+          <p:spPr>
+            <a:xfrm flipH="1">
+              <a:off x="3371722" y="3295713"/>
+              <a:ext cx="1200278" cy="0"/>
+            </a:xfrm>
+            <a:prstGeom prst="line">
+              <a:avLst/>
+            </a:prstGeom>
+            <a:noFill/>
+            <a:ln w="25400"/>
+          </p:spPr>
+          <p:style>
+            <a:lnRef idx="1">
+              <a:schemeClr val="accent1"/>
+            </a:lnRef>
+            <a:fillRef idx="0">
+              <a:schemeClr val="accent1"/>
+            </a:fillRef>
+            <a:effectRef idx="0">
+              <a:schemeClr val="accent1"/>
+            </a:effectRef>
+            <a:fontRef idx="minor">
+              <a:schemeClr val="tx1"/>
+            </a:fontRef>
+          </p:style>
+        </p:cxnSp>
+        <p:cxnSp>
+          <p:nvCxnSpPr>
+            <p:cNvPr id="71" name="Straight Connector 70">
+              <a:extLst>
+                <a:ext uri="{FF2B5EF4-FFF2-40B4-BE49-F238E27FC236}">
+                  <a16:creationId xmlns:a16="http://schemas.microsoft.com/office/drawing/2014/main" id="{D19A2E4D-97C2-AB40-8E4A-7E457389198A}"/>
+                </a:ext>
+              </a:extLst>
+            </p:cNvPr>
+            <p:cNvCxnSpPr>
+              <a:cxnSpLocks/>
+            </p:cNvCxnSpPr>
+            <p:nvPr/>
+          </p:nvCxnSpPr>
+          <p:spPr>
+            <a:xfrm flipH="1" flipV="1">
+              <a:off x="3695084" y="2968327"/>
+              <a:ext cx="9770" cy="1250716"/>
+            </a:xfrm>
+            <a:prstGeom prst="line">
+              <a:avLst/>
+            </a:prstGeom>
+            <a:noFill/>
+            <a:ln w="25400"/>
+          </p:spPr>
+          <p:style>
+            <a:lnRef idx="1">
+              <a:schemeClr val="accent1"/>
+            </a:lnRef>
+            <a:fillRef idx="0">
+              <a:schemeClr val="accent1"/>
+            </a:fillRef>
+            <a:effectRef idx="0">
+              <a:schemeClr val="accent1"/>
+            </a:effectRef>
+            <a:fontRef idx="minor">
+              <a:schemeClr val="tx1"/>
+            </a:fontRef>
+          </p:style>
+        </p:cxnSp>
+        <p:sp>
+          <p:nvSpPr>
+            <p:cNvPr id="3" name="Right Arrow 2">
+              <a:extLst>
+                <a:ext uri="{FF2B5EF4-FFF2-40B4-BE49-F238E27FC236}">
+                  <a16:creationId xmlns:a16="http://schemas.microsoft.com/office/drawing/2014/main" id="{2FD1FB08-32C6-234E-AE37-E00D30A774C7}"/>
+                </a:ext>
+              </a:extLst>
+            </p:cNvPr>
+            <p:cNvSpPr/>
+            <p:nvPr/>
+          </p:nvSpPr>
+          <p:spPr>
+            <a:xfrm>
+              <a:off x="4962841" y="3429000"/>
+              <a:ext cx="1071064" cy="335159"/>
+            </a:xfrm>
+            <a:prstGeom prst="rightArrow">
+              <a:avLst>
+                <a:gd name="adj1" fmla="val 43728"/>
+                <a:gd name="adj2" fmla="val 50000"/>
+              </a:avLst>
+            </a:prstGeom>
+            <a:noFill/>
+          </p:spPr>
+          <p:style>
+            <a:lnRef idx="2">
+              <a:schemeClr val="accent1">
+                <a:shade val="50000"/>
+              </a:schemeClr>
+            </a:lnRef>
+            <a:fillRef idx="1">
+              <a:schemeClr val="accent1"/>
+            </a:fillRef>
+            <a:effectRef idx="0">
+              <a:schemeClr val="accent1"/>
+            </a:effectRef>
+            <a:fontRef idx="minor">
+              <a:schemeClr val="lt1"/>
+            </a:fontRef>
+          </p:style>
+          <p:txBody>
+            <a:bodyPr rtlCol="0" anchor="ctr"/>
+            <a:lstStyle/>
+            <a:p>
+              <a:pPr algn="ctr"/>
+              <a:endParaRPr lang="en-US"/>
+            </a:p>
+          </p:txBody>
+        </p:sp>
+        <p:sp>
+          <p:nvSpPr>
+            <p:cNvPr id="78" name="TextBox 77">
+              <a:extLst>
+                <a:ext uri="{FF2B5EF4-FFF2-40B4-BE49-F238E27FC236}">
+                  <a16:creationId xmlns:a16="http://schemas.microsoft.com/office/drawing/2014/main" id="{1F91469E-D782-D44C-B9A1-B625AF4AC00B}"/>
+                </a:ext>
+              </a:extLst>
+            </p:cNvPr>
+            <p:cNvSpPr txBox="1"/>
+            <p:nvPr/>
+          </p:nvSpPr>
+          <p:spPr>
+            <a:xfrm>
+              <a:off x="6874006" y="3403870"/>
+              <a:ext cx="957305" cy="923330"/>
+            </a:xfrm>
+            <a:prstGeom prst="rect">
+              <a:avLst/>
+            </a:prstGeom>
+            <a:noFill/>
+            <a:ln w="9525">
+              <a:solidFill>
+                <a:schemeClr val="accent1">
+                  <a:shade val="50000"/>
+                </a:schemeClr>
+              </a:solidFill>
+            </a:ln>
+          </p:spPr>
+          <p:txBody>
+            <a:bodyPr wrap="square" rtlCol="0">
+              <a:spAutoFit/>
+            </a:bodyPr>
+            <a:lstStyle/>
+            <a:p>
+              <a:r>
+                <a:rPr lang="en-US" dirty="0"/>
+                <a:t>0   1   0  </a:t>
+              </a:r>
+            </a:p>
+            <a:p>
+              <a:r>
+                <a:rPr lang="en-US" dirty="0"/>
+                <a:t>1   1   2  </a:t>
+              </a:r>
+            </a:p>
+            <a:p>
+              <a:r>
+                <a:rPr lang="en-US" dirty="0"/>
+                <a:t>0   2   2  </a:t>
+              </a:r>
+            </a:p>
+          </p:txBody>
+        </p:sp>
+        <p:sp>
+          <p:nvSpPr>
+            <p:cNvPr id="18" name="TextBox 17">
+              <a:extLst>
+                <a:ext uri="{FF2B5EF4-FFF2-40B4-BE49-F238E27FC236}">
+                  <a16:creationId xmlns:a16="http://schemas.microsoft.com/office/drawing/2014/main" id="{47605C79-8EEF-D946-A666-7E562C8D55D5}"/>
+                </a:ext>
+              </a:extLst>
+            </p:cNvPr>
+            <p:cNvSpPr txBox="1"/>
+            <p:nvPr/>
+          </p:nvSpPr>
+          <p:spPr>
+            <a:xfrm>
+              <a:off x="7840928" y="3402139"/>
+              <a:ext cx="1688553" cy="923330"/>
+            </a:xfrm>
+            <a:prstGeom prst="rect">
+              <a:avLst/>
+            </a:prstGeom>
+            <a:noFill/>
+          </p:spPr>
+          <p:txBody>
+            <a:bodyPr wrap="square" rtlCol="0">
+              <a:spAutoFit/>
+            </a:bodyPr>
+            <a:lstStyle/>
+            <a:p>
+              <a:r>
+                <a:rPr lang="en-US" dirty="0"/>
+                <a:t>Table of element name indices</a:t>
+              </a:r>
+            </a:p>
+          </p:txBody>
+        </p:sp>
+        <p:sp>
+          <p:nvSpPr>
+            <p:cNvPr id="79" name="TextBox 78">
+              <a:extLst>
+                <a:ext uri="{FF2B5EF4-FFF2-40B4-BE49-F238E27FC236}">
+                  <a16:creationId xmlns:a16="http://schemas.microsoft.com/office/drawing/2014/main" id="{8E54D6A5-D3E1-B34F-9F30-F045BBB5FC0E}"/>
+                </a:ext>
+              </a:extLst>
+            </p:cNvPr>
+            <p:cNvSpPr txBox="1"/>
+            <p:nvPr/>
+          </p:nvSpPr>
+          <p:spPr>
+            <a:xfrm>
+              <a:off x="6817483" y="2386476"/>
+              <a:ext cx="1013828" cy="369332"/>
+            </a:xfrm>
+            <a:prstGeom prst="rect">
+              <a:avLst/>
+            </a:prstGeom>
+            <a:noFill/>
+            <a:ln w="9525">
+              <a:solidFill>
+                <a:schemeClr val="accent1">
+                  <a:shade val="50000"/>
+                </a:schemeClr>
+              </a:solidFill>
+              <a:prstDash val="solid"/>
+            </a:ln>
+          </p:spPr>
+          <p:txBody>
+            <a:bodyPr wrap="square" rtlCol="0">
+              <a:spAutoFit/>
+            </a:bodyPr>
+            <a:lstStyle/>
+            <a:p>
+              <a:r>
+                <a:rPr lang="en-US" dirty="0"/>
+                <a:t>r    p   s  </a:t>
+              </a:r>
+            </a:p>
+          </p:txBody>
+        </p:sp>
+        <p:sp>
+          <p:nvSpPr>
+            <p:cNvPr id="45" name="TextBox 44">
+              <a:extLst>
+                <a:ext uri="{FF2B5EF4-FFF2-40B4-BE49-F238E27FC236}">
+                  <a16:creationId xmlns:a16="http://schemas.microsoft.com/office/drawing/2014/main" id="{0510F3F5-D785-E74D-A595-7174A770A2D7}"/>
+                </a:ext>
+              </a:extLst>
+            </p:cNvPr>
+            <p:cNvSpPr txBox="1"/>
+            <p:nvPr/>
+          </p:nvSpPr>
+          <p:spPr>
+            <a:xfrm>
+              <a:off x="6814276" y="2029140"/>
+              <a:ext cx="853119" cy="369332"/>
+            </a:xfrm>
+            <a:prstGeom prst="rect">
+              <a:avLst/>
+            </a:prstGeom>
+            <a:noFill/>
+            <a:ln w="25400">
+              <a:noFill/>
+              <a:prstDash val="dash"/>
+            </a:ln>
+          </p:spPr>
+          <p:txBody>
+            <a:bodyPr wrap="none" rtlCol="0">
+              <a:spAutoFit/>
+            </a:bodyPr>
+            <a:lstStyle/>
+            <a:p>
+              <a:r>
+                <a:rPr lang="en-US" i="1" dirty="0">
+                  <a:solidFill>
+                    <a:schemeClr val="bg1">
+                      <a:lumMod val="50000"/>
+                    </a:schemeClr>
+                  </a:solidFill>
+                </a:rPr>
+                <a:t>0   1   2</a:t>
+              </a:r>
+            </a:p>
+          </p:txBody>
+        </p:sp>
+        <p:sp>
+          <p:nvSpPr>
+            <p:cNvPr id="5" name="TextBox 4">
+              <a:extLst>
+                <a:ext uri="{FF2B5EF4-FFF2-40B4-BE49-F238E27FC236}">
+                  <a16:creationId xmlns:a16="http://schemas.microsoft.com/office/drawing/2014/main" id="{38FF7951-9C7D-0944-91E6-D762D0CB2734}"/>
+                </a:ext>
+              </a:extLst>
+            </p:cNvPr>
+            <p:cNvSpPr txBox="1"/>
+            <p:nvPr/>
+          </p:nvSpPr>
+          <p:spPr>
+            <a:xfrm>
+              <a:off x="7840929" y="2386476"/>
+              <a:ext cx="2295355" cy="369332"/>
+            </a:xfrm>
+            <a:prstGeom prst="rect">
+              <a:avLst/>
+            </a:prstGeom>
+            <a:noFill/>
+          </p:spPr>
+          <p:txBody>
+            <a:bodyPr wrap="square" rtlCol="0">
+              <a:spAutoFit/>
+            </a:bodyPr>
+            <a:lstStyle/>
+            <a:p>
+              <a:r>
+                <a:rPr lang="en-US" dirty="0"/>
+                <a:t>List of element names   </a:t>
+              </a:r>
+            </a:p>
+          </p:txBody>
+        </p:sp>
+        <p:sp>
+          <p:nvSpPr>
+            <p:cNvPr id="19" name="TextBox 18">
+              <a:extLst>
+                <a:ext uri="{FF2B5EF4-FFF2-40B4-BE49-F238E27FC236}">
+                  <a16:creationId xmlns:a16="http://schemas.microsoft.com/office/drawing/2014/main" id="{A9934D94-7AE3-8140-9FA9-14D754997767}"/>
+                </a:ext>
+              </a:extLst>
+            </p:cNvPr>
+            <p:cNvSpPr txBox="1"/>
+            <p:nvPr/>
+          </p:nvSpPr>
+          <p:spPr>
+            <a:xfrm>
+              <a:off x="7840929" y="2036495"/>
+              <a:ext cx="910359" cy="369332"/>
+            </a:xfrm>
+            <a:prstGeom prst="rect">
+              <a:avLst/>
+            </a:prstGeom>
+            <a:noFill/>
+            <a:ln w="25400">
+              <a:noFill/>
+              <a:prstDash val="dash"/>
+            </a:ln>
+          </p:spPr>
+          <p:txBody>
+            <a:bodyPr wrap="none" rtlCol="0">
+              <a:spAutoFit/>
+            </a:bodyPr>
+            <a:lstStyle>
+              <a:defPPr>
+                <a:defRPr lang="en-US"/>
+              </a:defPPr>
+              <a:lvl1pPr>
+                <a:defRPr i="1">
+                  <a:solidFill>
+                    <a:schemeClr val="bg1">
+                      <a:lumMod val="50000"/>
+                    </a:schemeClr>
+                  </a:solidFill>
+                </a:defRPr>
+              </a:lvl1pPr>
+            </a:lstStyle>
+            <a:p>
+              <a:r>
+                <a:rPr lang="en-US" dirty="0"/>
+                <a:t>Indices</a:t>
+              </a:r>
+            </a:p>
+          </p:txBody>
+        </p:sp>
+        <p:sp>
+          <p:nvSpPr>
+            <p:cNvPr id="22" name="TextBox 21">
+              <a:extLst>
+                <a:ext uri="{FF2B5EF4-FFF2-40B4-BE49-F238E27FC236}">
+                  <a16:creationId xmlns:a16="http://schemas.microsoft.com/office/drawing/2014/main" id="{66EAB188-3FEF-7E4B-B0E0-74A0066D8FE9}"/>
+                </a:ext>
+              </a:extLst>
+            </p:cNvPr>
+            <p:cNvSpPr txBox="1"/>
+            <p:nvPr/>
+          </p:nvSpPr>
+          <p:spPr>
+            <a:xfrm>
+              <a:off x="6874005" y="3009344"/>
+              <a:ext cx="853119" cy="369332"/>
+            </a:xfrm>
+            <a:prstGeom prst="rect">
+              <a:avLst/>
+            </a:prstGeom>
+            <a:noFill/>
+            <a:ln w="25400">
+              <a:noFill/>
+              <a:prstDash val="dash"/>
+            </a:ln>
+          </p:spPr>
+          <p:txBody>
+            <a:bodyPr wrap="none" rtlCol="0">
+              <a:spAutoFit/>
+            </a:bodyPr>
+            <a:lstStyle/>
+            <a:p>
+              <a:r>
+                <a:rPr lang="en-US" i="1" dirty="0">
+                  <a:solidFill>
+                    <a:schemeClr val="bg1">
+                      <a:lumMod val="50000"/>
+                    </a:schemeClr>
+                  </a:solidFill>
+                </a:rPr>
+                <a:t>0   1   2</a:t>
+              </a:r>
+            </a:p>
+          </p:txBody>
+        </p:sp>
+        <p:sp>
+          <p:nvSpPr>
+            <p:cNvPr id="23" name="TextBox 22">
+              <a:extLst>
+                <a:ext uri="{FF2B5EF4-FFF2-40B4-BE49-F238E27FC236}">
+                  <a16:creationId xmlns:a16="http://schemas.microsoft.com/office/drawing/2014/main" id="{DEEFC7EE-E3FD-7649-808F-AC3343027B4C}"/>
+                </a:ext>
+              </a:extLst>
+            </p:cNvPr>
+            <p:cNvSpPr txBox="1"/>
+            <p:nvPr/>
+          </p:nvSpPr>
+          <p:spPr>
+            <a:xfrm>
+              <a:off x="6510201" y="3396514"/>
+              <a:ext cx="306495" cy="923329"/>
+            </a:xfrm>
+            <a:prstGeom prst="rect">
+              <a:avLst/>
+            </a:prstGeom>
+            <a:noFill/>
+            <a:ln w="25400">
+              <a:noFill/>
+              <a:prstDash val="dash"/>
+            </a:ln>
+          </p:spPr>
+          <p:txBody>
+            <a:bodyPr wrap="square" rtlCol="0">
+              <a:spAutoFit/>
+            </a:bodyPr>
+            <a:lstStyle/>
+            <a:p>
+              <a:r>
+                <a:rPr lang="en-US" i="1" dirty="0">
+                  <a:solidFill>
+                    <a:schemeClr val="bg1">
+                      <a:lumMod val="50000"/>
+                    </a:schemeClr>
+                  </a:solidFill>
+                </a:rPr>
+                <a:t>0   1   2</a:t>
+              </a:r>
+            </a:p>
+          </p:txBody>
+        </p:sp>
+        <p:sp>
+          <p:nvSpPr>
+            <p:cNvPr id="9" name="TextBox 8">
+              <a:extLst>
+                <a:ext uri="{FF2B5EF4-FFF2-40B4-BE49-F238E27FC236}">
+                  <a16:creationId xmlns:a16="http://schemas.microsoft.com/office/drawing/2014/main" id="{09BCA3AF-63B9-ED49-B671-14C1F655C32A}"/>
+                </a:ext>
+              </a:extLst>
+            </p:cNvPr>
+            <p:cNvSpPr txBox="1"/>
+            <p:nvPr/>
+          </p:nvSpPr>
+          <p:spPr>
+            <a:xfrm>
+              <a:off x="2348754" y="4526281"/>
+              <a:ext cx="2814917" cy="646331"/>
+            </a:xfrm>
+            <a:prstGeom prst="rect">
+              <a:avLst/>
+            </a:prstGeom>
+            <a:noFill/>
+          </p:spPr>
+          <p:txBody>
+            <a:bodyPr wrap="square" rtlCol="0">
+              <a:spAutoFit/>
+            </a:bodyPr>
+            <a:lstStyle/>
+            <a:p>
+              <a:pPr algn="ctr"/>
+              <a:r>
+                <a:rPr lang="en-US" dirty="0"/>
+                <a:t>Cayley Table for the Rock-Paper-Scissors (</a:t>
+              </a:r>
+              <a:r>
+                <a:rPr lang="en-US" dirty="0" err="1"/>
+                <a:t>rps</a:t>
+              </a:r>
+              <a:r>
+                <a:rPr lang="en-US" dirty="0"/>
+                <a:t>) Magma</a:t>
+              </a:r>
+            </a:p>
+          </p:txBody>
+        </p:sp>
+        <p:sp>
+          <p:nvSpPr>
+            <p:cNvPr id="26" name="TextBox 25">
+              <a:extLst>
+                <a:ext uri="{FF2B5EF4-FFF2-40B4-BE49-F238E27FC236}">
+                  <a16:creationId xmlns:a16="http://schemas.microsoft.com/office/drawing/2014/main" id="{9C54E5DB-F106-DA4D-BB60-C3CC558FBA3D}"/>
+                </a:ext>
+              </a:extLst>
+            </p:cNvPr>
+            <p:cNvSpPr txBox="1"/>
+            <p:nvPr/>
+          </p:nvSpPr>
+          <p:spPr>
+            <a:xfrm>
+              <a:off x="6341156" y="4526281"/>
+              <a:ext cx="2596656" cy="646331"/>
+            </a:xfrm>
+            <a:prstGeom prst="rect">
+              <a:avLst/>
+            </a:prstGeom>
+            <a:noFill/>
+          </p:spPr>
+          <p:txBody>
+            <a:bodyPr wrap="square" rtlCol="0">
+              <a:spAutoFit/>
+            </a:bodyPr>
+            <a:lstStyle/>
+            <a:p>
+              <a:pPr algn="ctr"/>
+              <a:r>
+                <a:rPr lang="en-US" dirty="0"/>
+                <a:t>How it’s represented here as a List and a Table</a:t>
+              </a:r>
+            </a:p>
+          </p:txBody>
+        </p:sp>
+      </p:grpSp>
+    </p:spTree>
+    <p:extLst>
+      <p:ext uri="{BB962C8B-B14F-4D97-AF65-F5344CB8AC3E}">
+        <p14:creationId xmlns:p14="http://schemas.microsoft.com/office/powerpoint/2010/main" val="2583979201"/>
+      </p:ext>
+    </p:extLst>
+  </p:cSld>
+  <p:clrMapOvr>
+    <a:masterClrMapping/>
+  </p:clrMapOvr>
+</p:sld>
+</file>
+
 <file path=ppt/theme/theme1.xml><?xml version="1.0" encoding="utf-8"?>
 <a:theme xmlns:a="http://schemas.openxmlformats.org/drawingml/2006/main" name="Office Theme">
   <a:themeElements>

</xml_diff>

<commit_message>
fixed errors in docs
</commit_message>
<xml_diff>
--- a/misc/group_representation.pptx
+++ b/misc/group_representation.pptx
@@ -262,7 +262,7 @@
           <a:p>
             <a:fld id="{084E4D11-7DD8-6241-BDF9-F23E33E31776}" type="datetimeFigureOut">
               <a:rPr lang="en-US" smtClean="0"/>
-              <a:t>1/21/22</a:t>
+              <a:t>6/16/23</a:t>
             </a:fld>
             <a:endParaRPr lang="en-US"/>
           </a:p>
@@ -460,7 +460,7 @@
           <a:p>
             <a:fld id="{084E4D11-7DD8-6241-BDF9-F23E33E31776}" type="datetimeFigureOut">
               <a:rPr lang="en-US" smtClean="0"/>
-              <a:t>1/21/22</a:t>
+              <a:t>6/16/23</a:t>
             </a:fld>
             <a:endParaRPr lang="en-US"/>
           </a:p>
@@ -668,7 +668,7 @@
           <a:p>
             <a:fld id="{084E4D11-7DD8-6241-BDF9-F23E33E31776}" type="datetimeFigureOut">
               <a:rPr lang="en-US" smtClean="0"/>
-              <a:t>1/21/22</a:t>
+              <a:t>6/16/23</a:t>
             </a:fld>
             <a:endParaRPr lang="en-US"/>
           </a:p>
@@ -866,7 +866,7 @@
           <a:p>
             <a:fld id="{084E4D11-7DD8-6241-BDF9-F23E33E31776}" type="datetimeFigureOut">
               <a:rPr lang="en-US" smtClean="0"/>
-              <a:t>1/21/22</a:t>
+              <a:t>6/16/23</a:t>
             </a:fld>
             <a:endParaRPr lang="en-US"/>
           </a:p>
@@ -1141,7 +1141,7 @@
           <a:p>
             <a:fld id="{084E4D11-7DD8-6241-BDF9-F23E33E31776}" type="datetimeFigureOut">
               <a:rPr lang="en-US" smtClean="0"/>
-              <a:t>1/21/22</a:t>
+              <a:t>6/16/23</a:t>
             </a:fld>
             <a:endParaRPr lang="en-US"/>
           </a:p>
@@ -1406,7 +1406,7 @@
           <a:p>
             <a:fld id="{084E4D11-7DD8-6241-BDF9-F23E33E31776}" type="datetimeFigureOut">
               <a:rPr lang="en-US" smtClean="0"/>
-              <a:t>1/21/22</a:t>
+              <a:t>6/16/23</a:t>
             </a:fld>
             <a:endParaRPr lang="en-US"/>
           </a:p>
@@ -1818,7 +1818,7 @@
           <a:p>
             <a:fld id="{084E4D11-7DD8-6241-BDF9-F23E33E31776}" type="datetimeFigureOut">
               <a:rPr lang="en-US" smtClean="0"/>
-              <a:t>1/21/22</a:t>
+              <a:t>6/16/23</a:t>
             </a:fld>
             <a:endParaRPr lang="en-US"/>
           </a:p>
@@ -1959,7 +1959,7 @@
           <a:p>
             <a:fld id="{084E4D11-7DD8-6241-BDF9-F23E33E31776}" type="datetimeFigureOut">
               <a:rPr lang="en-US" smtClean="0"/>
-              <a:t>1/21/22</a:t>
+              <a:t>6/16/23</a:t>
             </a:fld>
             <a:endParaRPr lang="en-US"/>
           </a:p>
@@ -2072,7 +2072,7 @@
           <a:p>
             <a:fld id="{084E4D11-7DD8-6241-BDF9-F23E33E31776}" type="datetimeFigureOut">
               <a:rPr lang="en-US" smtClean="0"/>
-              <a:t>1/21/22</a:t>
+              <a:t>6/16/23</a:t>
             </a:fld>
             <a:endParaRPr lang="en-US"/>
           </a:p>
@@ -2383,7 +2383,7 @@
           <a:p>
             <a:fld id="{084E4D11-7DD8-6241-BDF9-F23E33E31776}" type="datetimeFigureOut">
               <a:rPr lang="en-US" smtClean="0"/>
-              <a:t>1/21/22</a:t>
+              <a:t>6/16/23</a:t>
             </a:fld>
             <a:endParaRPr lang="en-US"/>
           </a:p>
@@ -2671,7 +2671,7 @@
           <a:p>
             <a:fld id="{084E4D11-7DD8-6241-BDF9-F23E33E31776}" type="datetimeFigureOut">
               <a:rPr lang="en-US" smtClean="0"/>
-              <a:t>1/21/22</a:t>
+              <a:t>6/16/23</a:t>
             </a:fld>
             <a:endParaRPr lang="en-US"/>
           </a:p>
@@ -2912,7 +2912,7 @@
           <a:p>
             <a:fld id="{084E4D11-7DD8-6241-BDF9-F23E33E31776}" type="datetimeFigureOut">
               <a:rPr lang="en-US" smtClean="0"/>
-              <a:t>1/21/22</a:t>
+              <a:t>6/16/23</a:t>
             </a:fld>
             <a:endParaRPr lang="en-US"/>
           </a:p>
@@ -5074,10 +5074,10 @@
       </p:sp>
       <p:grpSp>
         <p:nvGrpSpPr>
-          <p:cNvPr id="33" name="Group 32">
+          <p:cNvPr id="30" name="Group 29">
             <a:extLst>
               <a:ext uri="{FF2B5EF4-FFF2-40B4-BE49-F238E27FC236}">
-                <a16:creationId xmlns:a16="http://schemas.microsoft.com/office/drawing/2014/main" id="{8AE069F1-633F-6C43-9C79-82921B711E80}"/>
+                <a16:creationId xmlns:a16="http://schemas.microsoft.com/office/drawing/2014/main" id="{8CAF5680-28CE-41D5-1076-27B8ED7EAC1A}"/>
               </a:ext>
             </a:extLst>
           </p:cNvPr>
@@ -5087,9 +5087,9 @@
         <p:grpSpPr>
           <a:xfrm>
             <a:off x="4467165" y="1113300"/>
-            <a:ext cx="6405699" cy="4888032"/>
+            <a:ext cx="6405699" cy="4904594"/>
             <a:chOff x="4467165" y="1113300"/>
-            <a:chExt cx="6405699" cy="4888032"/>
+            <a:chExt cx="6405699" cy="4904594"/>
           </a:xfrm>
         </p:grpSpPr>
         <p:sp>
@@ -6010,7 +6010,7 @@
           </p:nvGrpSpPr>
           <p:grpSpPr>
             <a:xfrm>
-              <a:off x="5514940" y="4340384"/>
+              <a:off x="5168501" y="4798245"/>
               <a:ext cx="1612247" cy="1219649"/>
               <a:chOff x="6037454" y="4392246"/>
               <a:chExt cx="1612247" cy="1219649"/>
@@ -6222,6 +6222,180 @@
             </p:txBody>
           </p:sp>
         </p:grpSp>
+        <p:sp>
+          <p:nvSpPr>
+            <p:cNvPr id="14" name="TextBox 13">
+              <a:extLst>
+                <a:ext uri="{FF2B5EF4-FFF2-40B4-BE49-F238E27FC236}">
+                  <a16:creationId xmlns:a16="http://schemas.microsoft.com/office/drawing/2014/main" id="{4F6FF3BE-D42D-DEA2-F778-62501BF9EDE9}"/>
+                </a:ext>
+              </a:extLst>
+            </p:cNvPr>
+            <p:cNvSpPr txBox="1"/>
+            <p:nvPr/>
+          </p:nvSpPr>
+          <p:spPr>
+            <a:xfrm>
+              <a:off x="5168501" y="3775120"/>
+              <a:ext cx="1488142" cy="646331"/>
+            </a:xfrm>
+            <a:prstGeom prst="rect">
+              <a:avLst/>
+            </a:prstGeom>
+            <a:noFill/>
+            <a:ln>
+              <a:solidFill>
+                <a:schemeClr val="tx1"/>
+              </a:solidFill>
+            </a:ln>
+          </p:spPr>
+          <p:txBody>
+            <a:bodyPr wrap="square" rtlCol="0">
+              <a:spAutoFit/>
+            </a:bodyPr>
+            <a:lstStyle/>
+            <a:p>
+              <a:pPr algn="ctr"/>
+              <a:r>
+                <a:rPr lang="en-US" dirty="0" err="1"/>
+                <a:t>NDimensionalVectorSpace</a:t>
+              </a:r>
+              <a:endParaRPr lang="en-US" dirty="0"/>
+            </a:p>
+          </p:txBody>
+        </p:sp>
+        <p:cxnSp>
+          <p:nvCxnSpPr>
+            <p:cNvPr id="23" name="Straight Arrow Connector 22">
+              <a:extLst>
+                <a:ext uri="{FF2B5EF4-FFF2-40B4-BE49-F238E27FC236}">
+                  <a16:creationId xmlns:a16="http://schemas.microsoft.com/office/drawing/2014/main" id="{F8356F96-BF02-E400-08B7-60E55AD95F09}"/>
+                </a:ext>
+              </a:extLst>
+            </p:cNvPr>
+            <p:cNvCxnSpPr>
+              <a:cxnSpLocks/>
+              <a:endCxn id="3" idx="2"/>
+            </p:cNvCxnSpPr>
+            <p:nvPr/>
+          </p:nvCxnSpPr>
+          <p:spPr>
+            <a:xfrm flipH="1" flipV="1">
+              <a:off x="5912572" y="3524341"/>
+              <a:ext cx="1" cy="250779"/>
+            </a:xfrm>
+            <a:prstGeom prst="straightConnector1">
+              <a:avLst/>
+            </a:prstGeom>
+            <a:ln w="12700">
+              <a:solidFill>
+                <a:schemeClr val="tx1"/>
+              </a:solidFill>
+              <a:tailEnd type="triangle"/>
+            </a:ln>
+          </p:spPr>
+          <p:style>
+            <a:lnRef idx="1">
+              <a:schemeClr val="accent1"/>
+            </a:lnRef>
+            <a:fillRef idx="0">
+              <a:schemeClr val="accent1"/>
+            </a:fillRef>
+            <a:effectRef idx="0">
+              <a:schemeClr val="accent1"/>
+            </a:effectRef>
+            <a:fontRef idx="minor">
+              <a:schemeClr val="tx1"/>
+            </a:fontRef>
+          </p:style>
+        </p:cxnSp>
+        <p:sp>
+          <p:nvSpPr>
+            <p:cNvPr id="27" name="TextBox 26">
+              <a:extLst>
+                <a:ext uri="{FF2B5EF4-FFF2-40B4-BE49-F238E27FC236}">
+                  <a16:creationId xmlns:a16="http://schemas.microsoft.com/office/drawing/2014/main" id="{4F4EB264-3E3E-8CED-491C-E92DE3FE05E0}"/>
+                </a:ext>
+              </a:extLst>
+            </p:cNvPr>
+            <p:cNvSpPr txBox="1"/>
+            <p:nvPr/>
+          </p:nvSpPr>
+          <p:spPr>
+            <a:xfrm>
+              <a:off x="6881613" y="3775120"/>
+              <a:ext cx="1488142" cy="646331"/>
+            </a:xfrm>
+            <a:prstGeom prst="rect">
+              <a:avLst/>
+            </a:prstGeom>
+            <a:noFill/>
+            <a:ln>
+              <a:solidFill>
+                <a:schemeClr val="tx1"/>
+              </a:solidFill>
+            </a:ln>
+          </p:spPr>
+          <p:txBody>
+            <a:bodyPr wrap="square" rtlCol="0">
+              <a:spAutoFit/>
+            </a:bodyPr>
+            <a:lstStyle/>
+            <a:p>
+              <a:pPr algn="ctr"/>
+              <a:r>
+                <a:rPr lang="en-US" dirty="0" err="1"/>
+                <a:t>NDimensionalModule</a:t>
+              </a:r>
+              <a:endParaRPr lang="en-US" dirty="0"/>
+            </a:p>
+          </p:txBody>
+        </p:sp>
+        <p:cxnSp>
+          <p:nvCxnSpPr>
+            <p:cNvPr id="29" name="Elbow Connector 28">
+              <a:extLst>
+                <a:ext uri="{FF2B5EF4-FFF2-40B4-BE49-F238E27FC236}">
+                  <a16:creationId xmlns:a16="http://schemas.microsoft.com/office/drawing/2014/main" id="{9AF211EA-D43E-7E28-0B73-10F112E8E23E}"/>
+                </a:ext>
+              </a:extLst>
+            </p:cNvPr>
+            <p:cNvCxnSpPr>
+              <a:stCxn id="27" idx="0"/>
+              <a:endCxn id="4" idx="3"/>
+            </p:cNvCxnSpPr>
+            <p:nvPr/>
+          </p:nvCxnSpPr>
+          <p:spPr>
+            <a:xfrm rot="16200000" flipV="1">
+              <a:off x="6488869" y="2638305"/>
+              <a:ext cx="1053578" cy="1220052"/>
+            </a:xfrm>
+            <a:prstGeom prst="bentConnector2">
+              <a:avLst/>
+            </a:prstGeom>
+            <a:ln w="12700">
+              <a:solidFill>
+                <a:schemeClr val="tx1"/>
+              </a:solidFill>
+              <a:tailEnd type="triangle"/>
+            </a:ln>
+          </p:spPr>
+          <p:style>
+            <a:lnRef idx="1">
+              <a:schemeClr val="accent1"/>
+            </a:lnRef>
+            <a:fillRef idx="0">
+              <a:schemeClr val="accent1"/>
+            </a:fillRef>
+            <a:effectRef idx="0">
+              <a:schemeClr val="accent1"/>
+            </a:effectRef>
+            <a:fontRef idx="minor">
+              <a:schemeClr val="tx1"/>
+            </a:fontRef>
+          </p:style>
+        </p:cxnSp>
       </p:grpSp>
     </p:spTree>
     <p:extLst>

</xml_diff>